<commit_message>
Updated presentation and added logo
</commit_message>
<xml_diff>
--- a/presentation.pptx
+++ b/presentation.pptx
@@ -110,6 +110,11 @@
       </a:defRPr>
     </a:lvl9pPr>
   </p:defaultTextStyle>
+  <p:extLst>
+    <p:ext uri="{EFAFB233-063F-42B5-8137-9DF3F51BA10A}">
+      <p15:sldGuideLst xmlns:p15="http://schemas.microsoft.com/office/powerpoint/2012/main"/>
+    </p:ext>
+  </p:extLst>
 </p:presentation>
 </file>
 
@@ -244,7 +249,7 @@
           <a:p>
             <a:fld id="{3966D509-419C-41B3-BB9D-07ABB3C883B7}" type="datetimeFigureOut">
               <a:rPr lang="en-US" smtClean="0"/>
-              <a:t>3/16/2019</a:t>
+              <a:t>3/17/2019</a:t>
             </a:fld>
             <a:endParaRPr lang="en-US"/>
           </a:p>
@@ -414,7 +419,7 @@
           <a:p>
             <a:fld id="{3966D509-419C-41B3-BB9D-07ABB3C883B7}" type="datetimeFigureOut">
               <a:rPr lang="en-US" smtClean="0"/>
-              <a:t>3/16/2019</a:t>
+              <a:t>3/17/2019</a:t>
             </a:fld>
             <a:endParaRPr lang="en-US"/>
           </a:p>
@@ -594,7 +599,7 @@
           <a:p>
             <a:fld id="{3966D509-419C-41B3-BB9D-07ABB3C883B7}" type="datetimeFigureOut">
               <a:rPr lang="en-US" smtClean="0"/>
-              <a:t>3/16/2019</a:t>
+              <a:t>3/17/2019</a:t>
             </a:fld>
             <a:endParaRPr lang="en-US"/>
           </a:p>
@@ -764,7 +769,7 @@
           <a:p>
             <a:fld id="{3966D509-419C-41B3-BB9D-07ABB3C883B7}" type="datetimeFigureOut">
               <a:rPr lang="en-US" smtClean="0"/>
-              <a:t>3/16/2019</a:t>
+              <a:t>3/17/2019</a:t>
             </a:fld>
             <a:endParaRPr lang="en-US"/>
           </a:p>
@@ -1010,7 +1015,7 @@
           <a:p>
             <a:fld id="{3966D509-419C-41B3-BB9D-07ABB3C883B7}" type="datetimeFigureOut">
               <a:rPr lang="en-US" smtClean="0"/>
-              <a:t>3/16/2019</a:t>
+              <a:t>3/17/2019</a:t>
             </a:fld>
             <a:endParaRPr lang="en-US"/>
           </a:p>
@@ -1242,7 +1247,7 @@
           <a:p>
             <a:fld id="{3966D509-419C-41B3-BB9D-07ABB3C883B7}" type="datetimeFigureOut">
               <a:rPr lang="en-US" smtClean="0"/>
-              <a:t>3/16/2019</a:t>
+              <a:t>3/17/2019</a:t>
             </a:fld>
             <a:endParaRPr lang="en-US"/>
           </a:p>
@@ -1609,7 +1614,7 @@
           <a:p>
             <a:fld id="{3966D509-419C-41B3-BB9D-07ABB3C883B7}" type="datetimeFigureOut">
               <a:rPr lang="en-US" smtClean="0"/>
-              <a:t>3/16/2019</a:t>
+              <a:t>3/17/2019</a:t>
             </a:fld>
             <a:endParaRPr lang="en-US"/>
           </a:p>
@@ -1727,7 +1732,7 @@
           <a:p>
             <a:fld id="{3966D509-419C-41B3-BB9D-07ABB3C883B7}" type="datetimeFigureOut">
               <a:rPr lang="en-US" smtClean="0"/>
-              <a:t>3/16/2019</a:t>
+              <a:t>3/17/2019</a:t>
             </a:fld>
             <a:endParaRPr lang="en-US"/>
           </a:p>
@@ -1822,7 +1827,7 @@
           <a:p>
             <a:fld id="{3966D509-419C-41B3-BB9D-07ABB3C883B7}" type="datetimeFigureOut">
               <a:rPr lang="en-US" smtClean="0"/>
-              <a:t>3/16/2019</a:t>
+              <a:t>3/17/2019</a:t>
             </a:fld>
             <a:endParaRPr lang="en-US"/>
           </a:p>
@@ -2099,7 +2104,7 @@
           <a:p>
             <a:fld id="{3966D509-419C-41B3-BB9D-07ABB3C883B7}" type="datetimeFigureOut">
               <a:rPr lang="en-US" smtClean="0"/>
-              <a:t>3/16/2019</a:t>
+              <a:t>3/17/2019</a:t>
             </a:fld>
             <a:endParaRPr lang="en-US"/>
           </a:p>
@@ -2352,7 +2357,7 @@
           <a:p>
             <a:fld id="{3966D509-419C-41B3-BB9D-07ABB3C883B7}" type="datetimeFigureOut">
               <a:rPr lang="en-US" smtClean="0"/>
-              <a:t>3/16/2019</a:t>
+              <a:t>3/17/2019</a:t>
             </a:fld>
             <a:endParaRPr lang="en-US"/>
           </a:p>
@@ -2565,7 +2570,7 @@
           <a:p>
             <a:fld id="{3966D509-419C-41B3-BB9D-07ABB3C883B7}" type="datetimeFigureOut">
               <a:rPr lang="en-US" smtClean="0"/>
-              <a:t>3/16/2019</a:t>
+              <a:t>3/17/2019</a:t>
             </a:fld>
             <a:endParaRPr lang="en-US"/>
           </a:p>
@@ -3027,19 +3032,7 @@
               <a:rPr lang="en-US" dirty="0" smtClean="0">
                 <a:latin typeface="+mj-lt"/>
               </a:rPr>
-              <a:t>Jay Humphreys </a:t>
-            </a:r>
-            <a:r>
-              <a:rPr lang="en-US" dirty="0" smtClean="0">
-                <a:latin typeface="+mj-lt"/>
-              </a:rPr>
-              <a:t>| </a:t>
-            </a:r>
-            <a:r>
-              <a:rPr lang="en-US" dirty="0" smtClean="0">
-                <a:latin typeface="+mj-lt"/>
-              </a:rPr>
-              <a:t>Greg </a:t>
+              <a:t>Jay Humphreys | Greg </a:t>
             </a:r>
             <a:r>
               <a:rPr lang="en-US" dirty="0" err="1" smtClean="0">
@@ -3051,13 +3044,7 @@
               <a:rPr lang="en-US" dirty="0" smtClean="0">
                 <a:latin typeface="+mj-lt"/>
               </a:rPr>
-              <a:t> | Alex Elias </a:t>
-            </a:r>
-            <a:r>
-              <a:rPr lang="en-US" dirty="0" smtClean="0">
-                <a:latin typeface="+mj-lt"/>
-              </a:rPr>
-              <a:t>| Chris Sweet</a:t>
+              <a:t> | Alex Elias | Chris Sweet</a:t>
             </a:r>
             <a:endParaRPr lang="en-US" dirty="0">
               <a:latin typeface="+mj-lt"/>
@@ -3441,6 +3428,262 @@
           </a:p>
         </p:txBody>
       </p:sp>
+      <p:pic>
+        <p:nvPicPr>
+          <p:cNvPr id="2" name="Picture 1"/>
+          <p:cNvPicPr>
+            <a:picLocks noChangeAspect="1"/>
+          </p:cNvPicPr>
+          <p:nvPr/>
+        </p:nvPicPr>
+        <p:blipFill rotWithShape="1">
+          <a:blip r:embed="rId3"/>
+          <a:srcRect t="9132"/>
+          <a:stretch/>
+        </p:blipFill>
+        <p:spPr>
+          <a:xfrm>
+            <a:off x="1889661" y="1470321"/>
+            <a:ext cx="8412679" cy="4299990"/>
+          </a:xfrm>
+          <a:prstGeom prst="rect">
+            <a:avLst/>
+          </a:prstGeom>
+          <a:ln>
+            <a:solidFill>
+              <a:schemeClr val="tx1"/>
+            </a:solidFill>
+          </a:ln>
+        </p:spPr>
+      </p:pic>
+      <p:sp>
+        <p:nvSpPr>
+          <p:cNvPr id="3" name="TextBox 2"/>
+          <p:cNvSpPr txBox="1"/>
+          <p:nvPr/>
+        </p:nvSpPr>
+        <p:spPr>
+          <a:xfrm>
+            <a:off x="412771" y="2696986"/>
+            <a:ext cx="1727046" cy="923330"/>
+          </a:xfrm>
+          <a:prstGeom prst="rect">
+            <a:avLst/>
+          </a:prstGeom>
+          <a:solidFill>
+            <a:schemeClr val="accent4">
+              <a:lumMod val="20000"/>
+              <a:lumOff val="80000"/>
+            </a:schemeClr>
+          </a:solidFill>
+          <a:ln w="38100">
+            <a:solidFill>
+              <a:schemeClr val="tx1"/>
+            </a:solidFill>
+          </a:ln>
+        </p:spPr>
+        <p:txBody>
+          <a:bodyPr wrap="square" rtlCol="0">
+            <a:spAutoFit/>
+          </a:bodyPr>
+          <a:lstStyle/>
+          <a:p>
+            <a:pPr algn="ctr"/>
+            <a:r>
+              <a:rPr lang="en-US" dirty="0" smtClean="0"/>
+              <a:t>Filter based on accessibility requirements</a:t>
+            </a:r>
+            <a:endParaRPr lang="en-US" dirty="0"/>
+          </a:p>
+        </p:txBody>
+      </p:sp>
+      <p:cxnSp>
+        <p:nvCxnSpPr>
+          <p:cNvPr id="8" name="Straight Arrow Connector 7"/>
+          <p:cNvCxnSpPr>
+            <a:stCxn id="3" idx="2"/>
+          </p:cNvCxnSpPr>
+          <p:nvPr/>
+        </p:nvCxnSpPr>
+        <p:spPr>
+          <a:xfrm>
+            <a:off x="1276294" y="3620316"/>
+            <a:ext cx="613367" cy="655351"/>
+          </a:xfrm>
+          <a:prstGeom prst="straightConnector1">
+            <a:avLst/>
+          </a:prstGeom>
+          <a:ln w="38100">
+            <a:tailEnd type="triangle"/>
+          </a:ln>
+        </p:spPr>
+        <p:style>
+          <a:lnRef idx="3">
+            <a:schemeClr val="dk1"/>
+          </a:lnRef>
+          <a:fillRef idx="0">
+            <a:schemeClr val="dk1"/>
+          </a:fillRef>
+          <a:effectRef idx="2">
+            <a:schemeClr val="dk1"/>
+          </a:effectRef>
+          <a:fontRef idx="minor">
+            <a:schemeClr val="tx1"/>
+          </a:fontRef>
+        </p:style>
+      </p:cxnSp>
+      <p:sp>
+        <p:nvSpPr>
+          <p:cNvPr id="9" name="TextBox 8"/>
+          <p:cNvSpPr txBox="1"/>
+          <p:nvPr/>
+        </p:nvSpPr>
+        <p:spPr>
+          <a:xfrm>
+            <a:off x="9685867" y="1858786"/>
+            <a:ext cx="2093363" cy="923330"/>
+          </a:xfrm>
+          <a:prstGeom prst="rect">
+            <a:avLst/>
+          </a:prstGeom>
+          <a:solidFill>
+            <a:schemeClr val="accent4">
+              <a:lumMod val="20000"/>
+              <a:lumOff val="80000"/>
+            </a:schemeClr>
+          </a:solidFill>
+          <a:ln w="38100">
+            <a:solidFill>
+              <a:schemeClr val="tx1"/>
+            </a:solidFill>
+          </a:ln>
+        </p:spPr>
+        <p:txBody>
+          <a:bodyPr wrap="square" rtlCol="0">
+            <a:spAutoFit/>
+          </a:bodyPr>
+          <a:lstStyle/>
+          <a:p>
+            <a:pPr algn="ctr"/>
+            <a:r>
+              <a:rPr lang="en-US" dirty="0" smtClean="0"/>
+              <a:t>Map designed with custom graphical generator tool</a:t>
+            </a:r>
+            <a:endParaRPr lang="en-US" dirty="0"/>
+          </a:p>
+        </p:txBody>
+      </p:sp>
+      <p:cxnSp>
+        <p:nvCxnSpPr>
+          <p:cNvPr id="10" name="Straight Arrow Connector 9"/>
+          <p:cNvCxnSpPr>
+            <a:stCxn id="9" idx="2"/>
+          </p:cNvCxnSpPr>
+          <p:nvPr/>
+        </p:nvCxnSpPr>
+        <p:spPr>
+          <a:xfrm flipH="1">
+            <a:off x="9304867" y="2782116"/>
+            <a:ext cx="1427682" cy="838200"/>
+          </a:xfrm>
+          <a:prstGeom prst="straightConnector1">
+            <a:avLst/>
+          </a:prstGeom>
+          <a:ln w="38100">
+            <a:tailEnd type="triangle"/>
+          </a:ln>
+        </p:spPr>
+        <p:style>
+          <a:lnRef idx="3">
+            <a:schemeClr val="dk1"/>
+          </a:lnRef>
+          <a:fillRef idx="0">
+            <a:schemeClr val="dk1"/>
+          </a:fillRef>
+          <a:effectRef idx="2">
+            <a:schemeClr val="dk1"/>
+          </a:effectRef>
+          <a:fontRef idx="minor">
+            <a:schemeClr val="tx1"/>
+          </a:fontRef>
+        </p:style>
+      </p:cxnSp>
+      <p:sp>
+        <p:nvSpPr>
+          <p:cNvPr id="14" name="TextBox 13"/>
+          <p:cNvSpPr txBox="1"/>
+          <p:nvPr/>
+        </p:nvSpPr>
+        <p:spPr>
+          <a:xfrm>
+            <a:off x="5700746" y="3486326"/>
+            <a:ext cx="2093363" cy="646331"/>
+          </a:xfrm>
+          <a:prstGeom prst="rect">
+            <a:avLst/>
+          </a:prstGeom>
+          <a:solidFill>
+            <a:schemeClr val="accent4">
+              <a:lumMod val="20000"/>
+              <a:lumOff val="80000"/>
+            </a:schemeClr>
+          </a:solidFill>
+          <a:ln w="38100">
+            <a:solidFill>
+              <a:schemeClr val="tx1"/>
+            </a:solidFill>
+          </a:ln>
+        </p:spPr>
+        <p:txBody>
+          <a:bodyPr wrap="square" rtlCol="0">
+            <a:spAutoFit/>
+          </a:bodyPr>
+          <a:lstStyle/>
+          <a:p>
+            <a:pPr algn="ctr"/>
+            <a:r>
+              <a:rPr lang="en-US" dirty="0" smtClean="0"/>
+              <a:t>Rooms update with live sensor data</a:t>
+            </a:r>
+            <a:endParaRPr lang="en-US" dirty="0"/>
+          </a:p>
+        </p:txBody>
+      </p:sp>
+      <p:cxnSp>
+        <p:nvCxnSpPr>
+          <p:cNvPr id="15" name="Straight Arrow Connector 14"/>
+          <p:cNvCxnSpPr>
+            <a:stCxn id="14" idx="1"/>
+          </p:cNvCxnSpPr>
+          <p:nvPr/>
+        </p:nvCxnSpPr>
+        <p:spPr>
+          <a:xfrm flipH="1" flipV="1">
+            <a:off x="4910665" y="3809491"/>
+            <a:ext cx="790081" cy="0"/>
+          </a:xfrm>
+          <a:prstGeom prst="straightConnector1">
+            <a:avLst/>
+          </a:prstGeom>
+          <a:ln w="38100">
+            <a:tailEnd type="triangle"/>
+          </a:ln>
+        </p:spPr>
+        <p:style>
+          <a:lnRef idx="3">
+            <a:schemeClr val="dk1"/>
+          </a:lnRef>
+          <a:fillRef idx="0">
+            <a:schemeClr val="dk1"/>
+          </a:fillRef>
+          <a:effectRef idx="2">
+            <a:schemeClr val="dk1"/>
+          </a:effectRef>
+          <a:fontRef idx="minor">
+            <a:schemeClr val="tx1"/>
+          </a:fontRef>
+        </p:style>
+      </p:cxnSp>
     </p:spTree>
     <p:extLst>
       <p:ext uri="{BB962C8B-B14F-4D97-AF65-F5344CB8AC3E}">
@@ -3882,11 +4125,7 @@
                     <a:p>
                       <a:r>
                         <a:rPr lang="en-US" dirty="0" smtClean="0"/>
-                        <a:t>Noise </a:t>
-                      </a:r>
-                      <a:r>
-                        <a:rPr lang="en-US" dirty="0" smtClean="0"/>
-                        <a:t>level</a:t>
+                        <a:t>Noise level</a:t>
                       </a:r>
                       <a:endParaRPr lang="en-US" dirty="0"/>
                     </a:p>
@@ -7805,7 +8044,13 @@
               <a:rPr lang="en-US" sz="4400" dirty="0" smtClean="0">
                 <a:latin typeface="+mj-lt"/>
               </a:rPr>
-              <a:t>Technologies Used for Implementation</a:t>
+              <a:t>Technologies Used for </a:t>
+            </a:r>
+            <a:r>
+              <a:rPr lang="en-US" sz="4400" dirty="0" smtClean="0">
+                <a:latin typeface="+mj-lt"/>
+              </a:rPr>
+              <a:t>Implementation</a:t>
             </a:r>
             <a:endParaRPr lang="en-US" sz="2400" b="1" dirty="0"/>
           </a:p>
@@ -7813,302 +8058,16 @@
       </p:sp>
       <p:sp>
         <p:nvSpPr>
-          <p:cNvPr id="6" name="Rounded Rectangle 5"/>
-          <p:cNvSpPr/>
+          <p:cNvPr id="9" name="AutoShape 6" descr="Image result for material ui"/>
+          <p:cNvSpPr>
+            <a:spLocks noChangeAspect="1" noChangeArrowheads="1"/>
+          </p:cNvSpPr>
           <p:nvPr/>
         </p:nvSpPr>
-        <p:spPr>
-          <a:xfrm>
-            <a:off x="709177" y="804949"/>
-            <a:ext cx="3171014" cy="5162122"/>
-          </a:xfrm>
-          <a:prstGeom prst="roundRect">
-            <a:avLst>
-              <a:gd name="adj" fmla="val 8140"/>
-            </a:avLst>
-          </a:prstGeom>
-        </p:spPr>
-        <p:style>
-          <a:lnRef idx="2">
-            <a:schemeClr val="accent3"/>
-          </a:lnRef>
-          <a:fillRef idx="1">
-            <a:schemeClr val="lt1"/>
-          </a:fillRef>
-          <a:effectRef idx="0">
-            <a:schemeClr val="accent3"/>
-          </a:effectRef>
-          <a:fontRef idx="minor">
-            <a:schemeClr val="dk1"/>
-          </a:fontRef>
-        </p:style>
-        <p:txBody>
-          <a:bodyPr rtlCol="0" anchor="t"/>
-          <a:lstStyle/>
-          <a:p>
-            <a:pPr algn="ctr">
-              <a:lnSpc>
-                <a:spcPct val="150000"/>
-              </a:lnSpc>
-            </a:pPr>
-            <a:r>
-              <a:rPr lang="en-US" b="1" dirty="0" smtClean="0"/>
-              <a:t>A-Layer Sensor Nodes</a:t>
-            </a:r>
-            <a:endParaRPr lang="en-US" b="1" dirty="0"/>
-          </a:p>
-          <a:p>
-            <a:pPr>
-              <a:lnSpc>
-                <a:spcPct val="150000"/>
-              </a:lnSpc>
-            </a:pPr>
-            <a:r>
-              <a:rPr lang="en-US" dirty="0" smtClean="0"/>
-              <a:t>Arduino Nano</a:t>
-            </a:r>
-          </a:p>
-          <a:p>
-            <a:pPr marL="285750" indent="-285750">
-              <a:lnSpc>
-                <a:spcPct val="150000"/>
-              </a:lnSpc>
-              <a:buFontTx/>
-              <a:buChar char="-"/>
-            </a:pPr>
-            <a:r>
-              <a:rPr lang="en-US" dirty="0" err="1" smtClean="0"/>
-              <a:t>ArduinoJson</a:t>
-            </a:r>
-            <a:endParaRPr lang="en-US" dirty="0" smtClean="0"/>
-          </a:p>
-          <a:p>
-            <a:pPr>
-              <a:lnSpc>
-                <a:spcPct val="150000"/>
-              </a:lnSpc>
-            </a:pPr>
-            <a:r>
-              <a:rPr lang="en-US" dirty="0" smtClean="0"/>
-              <a:t>nRF24 radio modules</a:t>
-            </a:r>
-          </a:p>
-          <a:p>
-            <a:pPr>
-              <a:lnSpc>
-                <a:spcPct val="150000"/>
-              </a:lnSpc>
-            </a:pPr>
-            <a:r>
-              <a:rPr lang="en-US" dirty="0" smtClean="0"/>
-              <a:t>Sensors</a:t>
-            </a:r>
-          </a:p>
-          <a:p>
-            <a:pPr marL="285750" indent="-285750">
-              <a:lnSpc>
-                <a:spcPct val="150000"/>
-              </a:lnSpc>
-              <a:buFontTx/>
-              <a:buChar char="-"/>
-            </a:pPr>
-            <a:r>
-              <a:rPr lang="en-US" dirty="0" smtClean="0"/>
-              <a:t>PIR</a:t>
-            </a:r>
-          </a:p>
-          <a:p>
-            <a:pPr marL="285750" indent="-285750">
-              <a:lnSpc>
-                <a:spcPct val="150000"/>
-              </a:lnSpc>
-              <a:buFontTx/>
-              <a:buChar char="-"/>
-            </a:pPr>
-            <a:r>
-              <a:rPr lang="en-US" dirty="0" smtClean="0"/>
-              <a:t>Acoustic</a:t>
-            </a:r>
-          </a:p>
-          <a:p>
-            <a:pPr marL="285750" indent="-285750">
-              <a:lnSpc>
-                <a:spcPct val="150000"/>
-              </a:lnSpc>
-              <a:buFontTx/>
-              <a:buChar char="-"/>
-            </a:pPr>
-            <a:r>
-              <a:rPr lang="en-US" dirty="0" smtClean="0"/>
-              <a:t>Buttons</a:t>
-            </a:r>
-          </a:p>
-          <a:p>
-            <a:pPr>
-              <a:lnSpc>
-                <a:spcPct val="150000"/>
-              </a:lnSpc>
-            </a:pPr>
-            <a:endParaRPr lang="en-US" dirty="0" smtClean="0"/>
-          </a:p>
-        </p:txBody>
-      </p:sp>
-      <p:sp>
-        <p:nvSpPr>
-          <p:cNvPr id="7" name="Rounded Rectangle 6"/>
-          <p:cNvSpPr/>
-          <p:nvPr/>
-        </p:nvSpPr>
-        <p:spPr>
-          <a:xfrm>
-            <a:off x="4376819" y="853210"/>
-            <a:ext cx="3093043" cy="5162122"/>
-          </a:xfrm>
-          <a:prstGeom prst="roundRect">
-            <a:avLst>
-              <a:gd name="adj" fmla="val 8140"/>
-            </a:avLst>
-          </a:prstGeom>
-        </p:spPr>
-        <p:style>
-          <a:lnRef idx="2">
-            <a:schemeClr val="accent3"/>
-          </a:lnRef>
-          <a:fillRef idx="1">
-            <a:schemeClr val="lt1"/>
-          </a:fillRef>
-          <a:effectRef idx="0">
-            <a:schemeClr val="accent3"/>
-          </a:effectRef>
-          <a:fontRef idx="minor">
-            <a:schemeClr val="dk1"/>
-          </a:fontRef>
-        </p:style>
-        <p:txBody>
-          <a:bodyPr rtlCol="0" anchor="t"/>
-          <a:lstStyle/>
-          <a:p>
-            <a:pPr algn="ctr">
-              <a:lnSpc>
-                <a:spcPct val="150000"/>
-              </a:lnSpc>
-            </a:pPr>
-            <a:r>
-              <a:rPr lang="el-GR" b="1" dirty="0" smtClean="0"/>
-              <a:t>π</a:t>
-            </a:r>
-            <a:r>
-              <a:rPr lang="en-US" b="1" dirty="0" smtClean="0"/>
-              <a:t>-Layer Intercommunication</a:t>
-            </a:r>
-          </a:p>
-        </p:txBody>
-      </p:sp>
-      <p:sp>
-        <p:nvSpPr>
-          <p:cNvPr id="8" name="Rounded Rectangle 7"/>
-          <p:cNvSpPr/>
-          <p:nvPr/>
-        </p:nvSpPr>
-        <p:spPr>
-          <a:xfrm>
-            <a:off x="8087458" y="853210"/>
-            <a:ext cx="3039880" cy="5162122"/>
-          </a:xfrm>
-          <a:prstGeom prst="roundRect">
-            <a:avLst>
-              <a:gd name="adj" fmla="val 8140"/>
-            </a:avLst>
-          </a:prstGeom>
-        </p:spPr>
-        <p:style>
-          <a:lnRef idx="2">
-            <a:schemeClr val="accent3"/>
-          </a:lnRef>
-          <a:fillRef idx="1">
-            <a:schemeClr val="lt1"/>
-          </a:fillRef>
-          <a:effectRef idx="0">
-            <a:schemeClr val="accent3"/>
-          </a:effectRef>
-          <a:fontRef idx="minor">
-            <a:schemeClr val="dk1"/>
-          </a:fontRef>
-        </p:style>
-        <p:txBody>
-          <a:bodyPr rtlCol="0" anchor="t"/>
-          <a:lstStyle/>
-          <a:p>
-            <a:pPr algn="ctr">
-              <a:lnSpc>
-                <a:spcPct val="150000"/>
-              </a:lnSpc>
-            </a:pPr>
-            <a:r>
-              <a:rPr lang="el-GR" b="1" dirty="0" smtClean="0"/>
-              <a:t>π</a:t>
-            </a:r>
-            <a:r>
-              <a:rPr lang="en-US" b="1" dirty="0" smtClean="0"/>
-              <a:t> Layer Web Front End</a:t>
-            </a:r>
-            <a:endParaRPr lang="en-US" dirty="0" smtClean="0"/>
-          </a:p>
-          <a:p>
-            <a:pPr marL="285750" indent="-285750">
-              <a:lnSpc>
-                <a:spcPct val="150000"/>
-              </a:lnSpc>
-              <a:buFontTx/>
-              <a:buChar char="-"/>
-            </a:pPr>
-            <a:endParaRPr lang="en-US" dirty="0" smtClean="0"/>
-          </a:p>
-          <a:p>
-            <a:pPr marL="285750" indent="-285750">
-              <a:lnSpc>
-                <a:spcPct val="150000"/>
-              </a:lnSpc>
-              <a:buFontTx/>
-              <a:buChar char="-"/>
-            </a:pPr>
-            <a:endParaRPr lang="en-US" dirty="0" smtClean="0"/>
-          </a:p>
-          <a:p>
-            <a:pPr>
-              <a:lnSpc>
-                <a:spcPct val="150000"/>
-              </a:lnSpc>
-            </a:pPr>
-            <a:endParaRPr lang="en-US" dirty="0" smtClean="0"/>
-          </a:p>
-        </p:txBody>
-      </p:sp>
-      <p:pic>
-        <p:nvPicPr>
-          <p:cNvPr id="5122" name="Picture 2" descr="Image result for facebook flux"/>
-          <p:cNvPicPr>
-            <a:picLocks noChangeAspect="1" noChangeArrowheads="1"/>
-          </p:cNvPicPr>
-          <p:nvPr/>
-        </p:nvPicPr>
-        <p:blipFill>
-          <a:blip r:embed="rId3" cstate="print">
-            <a:extLst>
-              <a:ext uri="{28A0092B-C50C-407E-A947-70E740481C1C}">
-                <a14:useLocalDpi xmlns:a14="http://schemas.microsoft.com/office/drawing/2010/main" val="0"/>
-              </a:ext>
-            </a:extLst>
-          </a:blip>
-          <a:srcRect/>
-          <a:stretch>
-            <a:fillRect/>
-          </a:stretch>
-        </p:blipFill>
         <p:spPr bwMode="auto">
           <a:xfrm>
-            <a:off x="8466992" y="4454241"/>
-            <a:ext cx="928575" cy="928575"/>
+            <a:off x="155575" y="-144463"/>
+            <a:ext cx="304800" cy="304801"/>
           </a:xfrm>
           <a:prstGeom prst="rect">
             <a:avLst/>
@@ -8124,30 +8083,30 @@
             </a:ext>
           </a:extLst>
         </p:spPr>
-      </p:pic>
-      <p:pic>
-        <p:nvPicPr>
-          <p:cNvPr id="5124" name="Picture 4" descr="Image result for webpack"/>
-          <p:cNvPicPr>
-            <a:picLocks noChangeAspect="1" noChangeArrowheads="1"/>
-          </p:cNvPicPr>
+        <p:txBody>
+          <a:bodyPr vert="horz" wrap="square" lIns="91440" tIns="45720" rIns="91440" bIns="45720" numCol="1" anchor="t" anchorCtr="0" compatLnSpc="1">
+            <a:prstTxWarp prst="textNoShape">
+              <a:avLst/>
+            </a:prstTxWarp>
+          </a:bodyPr>
+          <a:lstStyle/>
+          <a:p>
+            <a:endParaRPr lang="en-US"/>
+          </a:p>
+        </p:txBody>
+      </p:sp>
+      <p:sp>
+        <p:nvSpPr>
+          <p:cNvPr id="11" name="AutoShape 10" descr="Material-UI Logo"/>
+          <p:cNvSpPr>
+            <a:spLocks noChangeAspect="1" noChangeArrowheads="1"/>
+          </p:cNvSpPr>
           <p:nvPr/>
-        </p:nvPicPr>
-        <p:blipFill rotWithShape="1">
-          <a:blip r:embed="rId4">
-            <a:extLst>
-              <a:ext uri="{28A0092B-C50C-407E-A947-70E740481C1C}">
-                <a14:useLocalDpi xmlns:a14="http://schemas.microsoft.com/office/drawing/2010/main" val="0"/>
-              </a:ext>
-            </a:extLst>
-          </a:blip>
-          <a:srcRect l="13219" r="13944"/>
-          <a:stretch/>
-        </p:blipFill>
+        </p:nvSpPr>
         <p:spPr bwMode="auto">
           <a:xfrm>
-            <a:off x="9598590" y="2865357"/>
-            <a:ext cx="1307804" cy="1243396"/>
+            <a:off x="307975" y="7937"/>
+            <a:ext cx="304800" cy="304801"/>
           </a:xfrm>
           <a:prstGeom prst="rect">
             <a:avLst/>
@@ -8163,10 +8122,21 @@
             </a:ext>
           </a:extLst>
         </p:spPr>
-      </p:pic>
+        <p:txBody>
+          <a:bodyPr vert="horz" wrap="square" lIns="91440" tIns="45720" rIns="91440" bIns="45720" numCol="1" anchor="t" anchorCtr="0" compatLnSpc="1">
+            <a:prstTxWarp prst="textNoShape">
+              <a:avLst/>
+            </a:prstTxWarp>
+          </a:bodyPr>
+          <a:lstStyle/>
+          <a:p>
+            <a:endParaRPr lang="en-US"/>
+          </a:p>
+        </p:txBody>
+      </p:sp>
       <p:sp>
         <p:nvSpPr>
-          <p:cNvPr id="9" name="AutoShape 6" descr="Image result for material ui"/>
+          <p:cNvPr id="3" name="AutoShape 4" descr="ArduinoJson"/>
           <p:cNvSpPr>
             <a:spLocks noChangeAspect="1" noChangeArrowheads="1"/>
           </p:cNvSpPr>
@@ -8174,7 +8144,7 @@
         </p:nvSpPr>
         <p:spPr bwMode="auto">
           <a:xfrm>
-            <a:off x="155575" y="-144463"/>
+            <a:off x="460375" y="160337"/>
             <a:ext cx="304800" cy="304801"/>
           </a:xfrm>
           <a:prstGeom prst="rect">
@@ -8203,584 +8173,1230 @@
           </a:p>
         </p:txBody>
       </p:sp>
-      <p:sp>
-        <p:nvSpPr>
-          <p:cNvPr id="11" name="AutoShape 10" descr="Material-UI Logo"/>
-          <p:cNvSpPr>
-            <a:spLocks noChangeAspect="1" noChangeArrowheads="1"/>
-          </p:cNvSpPr>
-          <p:nvPr/>
-        </p:nvSpPr>
-        <p:spPr bwMode="auto">
-          <a:xfrm>
-            <a:off x="307975" y="7937"/>
-            <a:ext cx="304800" cy="304801"/>
-          </a:xfrm>
-          <a:prstGeom prst="rect">
-            <a:avLst/>
-          </a:prstGeom>
-          <a:noFill/>
-          <a:extLst>
-            <a:ext uri="{909E8E84-426E-40DD-AFC4-6F175D3DCCD1}">
-              <a14:hiddenFill xmlns:a14="http://schemas.microsoft.com/office/drawing/2010/main">
-                <a:solidFill>
-                  <a:srgbClr val="FFFFFF"/>
-                </a:solidFill>
-              </a14:hiddenFill>
-            </a:ext>
-          </a:extLst>
-        </p:spPr>
-        <p:txBody>
-          <a:bodyPr vert="horz" wrap="square" lIns="91440" tIns="45720" rIns="91440" bIns="45720" numCol="1" anchor="t" anchorCtr="0" compatLnSpc="1">
-            <a:prstTxWarp prst="textNoShape">
-              <a:avLst/>
-            </a:prstTxWarp>
-          </a:bodyPr>
-          <a:lstStyle/>
-          <a:p>
-            <a:endParaRPr lang="en-US"/>
-          </a:p>
-        </p:txBody>
-      </p:sp>
-      <p:pic>
-        <p:nvPicPr>
-          <p:cNvPr id="5138" name="Picture 18" descr="Image result for pyserial"/>
-          <p:cNvPicPr>
-            <a:picLocks noChangeAspect="1" noChangeArrowheads="1"/>
-          </p:cNvPicPr>
-          <p:nvPr/>
-        </p:nvPicPr>
-        <p:blipFill>
-          <a:blip r:embed="rId5">
-            <a:extLst>
-              <a:ext uri="{28A0092B-C50C-407E-A947-70E740481C1C}">
-                <a14:useLocalDpi xmlns:a14="http://schemas.microsoft.com/office/drawing/2010/main" val="0"/>
-              </a:ext>
-            </a:extLst>
-          </a:blip>
-          <a:srcRect/>
-          <a:stretch>
-            <a:fillRect/>
-          </a:stretch>
-        </p:blipFill>
-        <p:spPr bwMode="auto">
-          <a:xfrm>
-            <a:off x="5107997" y="3844129"/>
-            <a:ext cx="1537985" cy="836187"/>
-          </a:xfrm>
-          <a:prstGeom prst="rect">
-            <a:avLst/>
-          </a:prstGeom>
-          <a:noFill/>
-          <a:extLst>
-            <a:ext uri="{909E8E84-426E-40DD-AFC4-6F175D3DCCD1}">
-              <a14:hiddenFill xmlns:a14="http://schemas.microsoft.com/office/drawing/2010/main">
-                <a:solidFill>
-                  <a:srgbClr val="FFFFFF"/>
-                </a:solidFill>
-              </a14:hiddenFill>
-            </a:ext>
-          </a:extLst>
-        </p:spPr>
-      </p:pic>
-      <p:pic>
-        <p:nvPicPr>
-          <p:cNvPr id="18" name="Picture 12" descr="http://zeromq.wdfiles.com/local--files/admin:css/logo.gif"/>
-          <p:cNvPicPr>
-            <a:picLocks noChangeAspect="1" noChangeArrowheads="1"/>
-          </p:cNvPicPr>
-          <p:nvPr/>
-        </p:nvPicPr>
-        <p:blipFill>
-          <a:blip r:embed="rId6" cstate="print">
-            <a:extLst>
-              <a:ext uri="{28A0092B-C50C-407E-A947-70E740481C1C}">
-                <a14:useLocalDpi xmlns:a14="http://schemas.microsoft.com/office/drawing/2010/main" val="0"/>
-              </a:ext>
-            </a:extLst>
-          </a:blip>
-          <a:srcRect/>
-          <a:stretch>
-            <a:fillRect/>
-          </a:stretch>
-        </p:blipFill>
-        <p:spPr bwMode="auto">
-          <a:xfrm>
-            <a:off x="5107997" y="5049648"/>
-            <a:ext cx="1540049" cy="481014"/>
-          </a:xfrm>
-          <a:prstGeom prst="rect">
-            <a:avLst/>
-          </a:prstGeom>
-          <a:noFill/>
-          <a:extLst>
-            <a:ext uri="{909E8E84-426E-40DD-AFC4-6F175D3DCCD1}">
-              <a14:hiddenFill xmlns:a14="http://schemas.microsoft.com/office/drawing/2010/main">
-                <a:solidFill>
-                  <a:srgbClr val="FFFFFF"/>
-                </a:solidFill>
-              </a14:hiddenFill>
-            </a:ext>
-          </a:extLst>
-        </p:spPr>
-      </p:pic>
       <p:grpSp>
         <p:nvGrpSpPr>
-          <p:cNvPr id="13" name="Group 12"/>
+          <p:cNvPr id="37" name="Group 36"/>
           <p:cNvGrpSpPr/>
           <p:nvPr/>
         </p:nvGrpSpPr>
         <p:grpSpPr>
           <a:xfrm>
-            <a:off x="9731218" y="1506308"/>
-            <a:ext cx="1018164" cy="1311898"/>
-            <a:chOff x="8701366" y="1440469"/>
-            <a:chExt cx="1018164" cy="1311898"/>
+            <a:off x="769210" y="980950"/>
+            <a:ext cx="10653581" cy="5162122"/>
+            <a:chOff x="634277" y="810193"/>
+            <a:chExt cx="10653581" cy="5162122"/>
           </a:xfrm>
         </p:grpSpPr>
-        <p:pic>
-          <p:nvPicPr>
-            <p:cNvPr id="5136" name="Picture 16" descr="Image result for aiohttp"/>
-            <p:cNvPicPr>
-              <a:picLocks noChangeAspect="1" noChangeArrowheads="1"/>
-            </p:cNvPicPr>
+        <p:grpSp>
+          <p:nvGrpSpPr>
+            <p:cNvPr id="36" name="Group 35"/>
+            <p:cNvGrpSpPr/>
             <p:nvPr/>
-          </p:nvPicPr>
-          <p:blipFill>
-            <a:blip r:embed="rId7">
+          </p:nvGrpSpPr>
+          <p:grpSpPr>
+            <a:xfrm>
+              <a:off x="8087458" y="810193"/>
+              <a:ext cx="3200400" cy="5162122"/>
+              <a:chOff x="8087458" y="853210"/>
+              <a:chExt cx="3200400" cy="5162122"/>
+            </a:xfrm>
+          </p:grpSpPr>
+          <p:sp>
+            <p:nvSpPr>
+              <p:cNvPr id="8" name="Rounded Rectangle 7"/>
+              <p:cNvSpPr/>
+              <p:nvPr/>
+            </p:nvSpPr>
+            <p:spPr>
+              <a:xfrm>
+                <a:off x="8087458" y="853210"/>
+                <a:ext cx="3200400" cy="5162122"/>
+              </a:xfrm>
+              <a:prstGeom prst="roundRect">
+                <a:avLst>
+                  <a:gd name="adj" fmla="val 8140"/>
+                </a:avLst>
+              </a:prstGeom>
+            </p:spPr>
+            <p:style>
+              <a:lnRef idx="2">
+                <a:schemeClr val="accent3"/>
+              </a:lnRef>
+              <a:fillRef idx="1">
+                <a:schemeClr val="lt1"/>
+              </a:fillRef>
+              <a:effectRef idx="0">
+                <a:schemeClr val="accent3"/>
+              </a:effectRef>
+              <a:fontRef idx="minor">
+                <a:schemeClr val="dk1"/>
+              </a:fontRef>
+            </p:style>
+            <p:txBody>
+              <a:bodyPr rtlCol="0" anchor="t"/>
+              <a:lstStyle/>
+              <a:p>
+                <a:pPr algn="ctr">
+                  <a:lnSpc>
+                    <a:spcPct val="150000"/>
+                  </a:lnSpc>
+                </a:pPr>
+                <a:r>
+                  <a:rPr lang="el-GR" b="1" dirty="0" smtClean="0"/>
+                  <a:t>π</a:t>
+                </a:r>
+                <a:r>
+                  <a:rPr lang="en-US" b="1" dirty="0" smtClean="0"/>
+                  <a:t> Layer Web Front End</a:t>
+                </a:r>
+                <a:endParaRPr lang="en-US" dirty="0" smtClean="0"/>
+              </a:p>
+              <a:p>
+                <a:pPr marL="285750" indent="-285750">
+                  <a:lnSpc>
+                    <a:spcPct val="150000"/>
+                  </a:lnSpc>
+                  <a:buFontTx/>
+                  <a:buChar char="-"/>
+                </a:pPr>
+                <a:endParaRPr lang="en-US" dirty="0" smtClean="0"/>
+              </a:p>
+              <a:p>
+                <a:pPr marL="285750" indent="-285750">
+                  <a:lnSpc>
+                    <a:spcPct val="150000"/>
+                  </a:lnSpc>
+                  <a:buFontTx/>
+                  <a:buChar char="-"/>
+                </a:pPr>
+                <a:endParaRPr lang="en-US" dirty="0" smtClean="0"/>
+              </a:p>
+              <a:p>
+                <a:pPr>
+                  <a:lnSpc>
+                    <a:spcPct val="150000"/>
+                  </a:lnSpc>
+                </a:pPr>
+                <a:endParaRPr lang="en-US" dirty="0" smtClean="0"/>
+              </a:p>
+            </p:txBody>
+          </p:sp>
+          <p:pic>
+            <p:nvPicPr>
+              <p:cNvPr id="5122" name="Picture 2" descr="Image result for facebook flux"/>
+              <p:cNvPicPr>
+                <a:picLocks noChangeAspect="1" noChangeArrowheads="1"/>
+              </p:cNvPicPr>
+              <p:nvPr/>
+            </p:nvPicPr>
+            <p:blipFill>
+              <a:blip r:embed="rId3" cstate="print">
+                <a:extLst>
+                  <a:ext uri="{28A0092B-C50C-407E-A947-70E740481C1C}">
+                    <a14:useLocalDpi xmlns:a14="http://schemas.microsoft.com/office/drawing/2010/main" val="0"/>
+                  </a:ext>
+                </a:extLst>
+              </a:blip>
+              <a:srcRect/>
+              <a:stretch>
+                <a:fillRect/>
+              </a:stretch>
+            </p:blipFill>
+            <p:spPr bwMode="auto">
+              <a:xfrm>
+                <a:off x="8635365" y="4416469"/>
+                <a:ext cx="928575" cy="928575"/>
+              </a:xfrm>
+              <a:prstGeom prst="rect">
+                <a:avLst/>
+              </a:prstGeom>
+              <a:noFill/>
               <a:extLst>
-                <a:ext uri="{28A0092B-C50C-407E-A947-70E740481C1C}">
-                  <a14:useLocalDpi xmlns:a14="http://schemas.microsoft.com/office/drawing/2010/main" val="0"/>
+                <a:ext uri="{909E8E84-426E-40DD-AFC4-6F175D3DCCD1}">
+                  <a14:hiddenFill xmlns:a14="http://schemas.microsoft.com/office/drawing/2010/main">
+                    <a:solidFill>
+                      <a:srgbClr val="FFFFFF"/>
+                    </a:solidFill>
+                  </a14:hiddenFill>
                 </a:ext>
               </a:extLst>
-            </a:blip>
-            <a:srcRect/>
-            <a:stretch>
-              <a:fillRect/>
-            </a:stretch>
-          </p:blipFill>
-          <p:spPr bwMode="auto">
-            <a:xfrm>
-              <a:off x="8739725" y="1440469"/>
-              <a:ext cx="906213" cy="906214"/>
-            </a:xfrm>
-            <a:prstGeom prst="rect">
-              <a:avLst/>
-            </a:prstGeom>
-            <a:noFill/>
-            <a:extLst>
-              <a:ext uri="{909E8E84-426E-40DD-AFC4-6F175D3DCCD1}">
-                <a14:hiddenFill xmlns:a14="http://schemas.microsoft.com/office/drawing/2010/main">
-                  <a:solidFill>
-                    <a:srgbClr val="FFFFFF"/>
-                  </a:solidFill>
-                </a14:hiddenFill>
-              </a:ext>
-            </a:extLst>
-          </p:spPr>
-        </p:pic>
-        <p:sp>
-          <p:nvSpPr>
-            <p:cNvPr id="12" name="TextBox 11"/>
-            <p:cNvSpPr txBox="1"/>
-            <p:nvPr/>
-          </p:nvSpPr>
-          <p:spPr>
-            <a:xfrm>
-              <a:off x="8701366" y="2383035"/>
-              <a:ext cx="1018164" cy="369332"/>
-            </a:xfrm>
-            <a:prstGeom prst="rect">
-              <a:avLst/>
-            </a:prstGeom>
-            <a:noFill/>
-          </p:spPr>
-          <p:txBody>
-            <a:bodyPr wrap="none" rtlCol="0">
-              <a:spAutoFit/>
-            </a:bodyPr>
-            <a:lstStyle/>
-            <a:p>
-              <a:r>
-                <a:rPr lang="en-US" dirty="0" smtClean="0"/>
-                <a:t>AIOHTTP</a:t>
-              </a:r>
-              <a:endParaRPr lang="en-US" dirty="0"/>
-            </a:p>
-          </p:txBody>
-        </p:sp>
-      </p:grpSp>
-      <p:grpSp>
-        <p:nvGrpSpPr>
-          <p:cNvPr id="15" name="Group 14"/>
-          <p:cNvGrpSpPr/>
-          <p:nvPr/>
-        </p:nvGrpSpPr>
-        <p:grpSpPr>
-          <a:xfrm>
-            <a:off x="9646190" y="4381496"/>
-            <a:ext cx="1137684" cy="1336528"/>
-            <a:chOff x="10035012" y="1501637"/>
-            <a:chExt cx="1137684" cy="1336528"/>
-          </a:xfrm>
-        </p:grpSpPr>
-        <p:pic>
-          <p:nvPicPr>
-            <p:cNvPr id="5134" name="Picture 14" descr="Image result for react"/>
-            <p:cNvPicPr>
-              <a:picLocks noChangeAspect="1" noChangeArrowheads="1"/>
-            </p:cNvPicPr>
-            <p:nvPr/>
-          </p:nvPicPr>
-          <p:blipFill rotWithShape="1">
-            <a:blip r:embed="rId8" cstate="print">
+            </p:spPr>
+          </p:pic>
+          <p:pic>
+            <p:nvPicPr>
+              <p:cNvPr id="5124" name="Picture 4" descr="Image result for webpack"/>
+              <p:cNvPicPr>
+                <a:picLocks noChangeAspect="1" noChangeArrowheads="1"/>
+              </p:cNvPicPr>
+              <p:nvPr/>
+            </p:nvPicPr>
+            <p:blipFill rotWithShape="1">
+              <a:blip r:embed="rId4">
+                <a:extLst>
+                  <a:ext uri="{28A0092B-C50C-407E-A947-70E740481C1C}">
+                    <a14:useLocalDpi xmlns:a14="http://schemas.microsoft.com/office/drawing/2010/main" val="0"/>
+                  </a:ext>
+                </a:extLst>
+              </a:blip>
+              <a:srcRect l="13219" r="13944"/>
+              <a:stretch/>
+            </p:blipFill>
+            <p:spPr bwMode="auto">
+              <a:xfrm>
+                <a:off x="9766963" y="2827585"/>
+                <a:ext cx="1307804" cy="1243396"/>
+              </a:xfrm>
+              <a:prstGeom prst="rect">
+                <a:avLst/>
+              </a:prstGeom>
+              <a:noFill/>
               <a:extLst>
-                <a:ext uri="{28A0092B-C50C-407E-A947-70E740481C1C}">
-                  <a14:useLocalDpi xmlns:a14="http://schemas.microsoft.com/office/drawing/2010/main" val="0"/>
+                <a:ext uri="{909E8E84-426E-40DD-AFC4-6F175D3DCCD1}">
+                  <a14:hiddenFill xmlns:a14="http://schemas.microsoft.com/office/drawing/2010/main">
+                    <a:solidFill>
+                      <a:srgbClr val="FFFFFF"/>
+                    </a:solidFill>
+                  </a14:hiddenFill>
                 </a:ext>
               </a:extLst>
-            </a:blip>
-            <a:srcRect l="19847" t="11190" r="20432" b="11013"/>
-            <a:stretch/>
-          </p:blipFill>
-          <p:spPr bwMode="auto">
+            </p:spPr>
+          </p:pic>
+          <p:grpSp>
+            <p:nvGrpSpPr>
+              <p:cNvPr id="13" name="Group 12"/>
+              <p:cNvGrpSpPr/>
+              <p:nvPr/>
+            </p:nvGrpSpPr>
+            <p:grpSpPr>
+              <a:xfrm>
+                <a:off x="9899591" y="1502770"/>
+                <a:ext cx="1018164" cy="1311898"/>
+                <a:chOff x="8701366" y="1440469"/>
+                <a:chExt cx="1018164" cy="1311898"/>
+              </a:xfrm>
+            </p:grpSpPr>
+            <p:pic>
+              <p:nvPicPr>
+                <p:cNvPr id="5136" name="Picture 16" descr="Image result for aiohttp"/>
+                <p:cNvPicPr>
+                  <a:picLocks noChangeAspect="1" noChangeArrowheads="1"/>
+                </p:cNvPicPr>
+                <p:nvPr/>
+              </p:nvPicPr>
+              <p:blipFill>
+                <a:blip r:embed="rId5">
+                  <a:extLst>
+                    <a:ext uri="{28A0092B-C50C-407E-A947-70E740481C1C}">
+                      <a14:useLocalDpi xmlns:a14="http://schemas.microsoft.com/office/drawing/2010/main" val="0"/>
+                    </a:ext>
+                  </a:extLst>
+                </a:blip>
+                <a:srcRect/>
+                <a:stretch>
+                  <a:fillRect/>
+                </a:stretch>
+              </p:blipFill>
+              <p:spPr bwMode="auto">
+                <a:xfrm>
+                  <a:off x="8739725" y="1440469"/>
+                  <a:ext cx="906213" cy="906214"/>
+                </a:xfrm>
+                <a:prstGeom prst="rect">
+                  <a:avLst/>
+                </a:prstGeom>
+                <a:noFill/>
+                <a:extLst>
+                  <a:ext uri="{909E8E84-426E-40DD-AFC4-6F175D3DCCD1}">
+                    <a14:hiddenFill xmlns:a14="http://schemas.microsoft.com/office/drawing/2010/main">
+                      <a:solidFill>
+                        <a:srgbClr val="FFFFFF"/>
+                      </a:solidFill>
+                    </a14:hiddenFill>
+                  </a:ext>
+                </a:extLst>
+              </p:spPr>
+            </p:pic>
+            <p:sp>
+              <p:nvSpPr>
+                <p:cNvPr id="12" name="TextBox 11"/>
+                <p:cNvSpPr txBox="1"/>
+                <p:nvPr/>
+              </p:nvSpPr>
+              <p:spPr>
+                <a:xfrm>
+                  <a:off x="8701366" y="2383035"/>
+                  <a:ext cx="1018164" cy="369332"/>
+                </a:xfrm>
+                <a:prstGeom prst="rect">
+                  <a:avLst/>
+                </a:prstGeom>
+                <a:noFill/>
+              </p:spPr>
+              <p:txBody>
+                <a:bodyPr wrap="none" rtlCol="0">
+                  <a:spAutoFit/>
+                </a:bodyPr>
+                <a:lstStyle/>
+                <a:p>
+                  <a:r>
+                    <a:rPr lang="en-US" dirty="0" smtClean="0"/>
+                    <a:t>AIOHTTP</a:t>
+                  </a:r>
+                  <a:endParaRPr lang="en-US" dirty="0"/>
+                </a:p>
+              </p:txBody>
+            </p:sp>
+          </p:grpSp>
+          <p:grpSp>
+            <p:nvGrpSpPr>
+              <p:cNvPr id="15" name="Group 14"/>
+              <p:cNvGrpSpPr/>
+              <p:nvPr/>
+            </p:nvGrpSpPr>
+            <p:grpSpPr>
+              <a:xfrm>
+                <a:off x="9814563" y="4343724"/>
+                <a:ext cx="1137684" cy="1336528"/>
+                <a:chOff x="10035012" y="1501637"/>
+                <a:chExt cx="1137684" cy="1336528"/>
+              </a:xfrm>
+            </p:grpSpPr>
+            <p:pic>
+              <p:nvPicPr>
+                <p:cNvPr id="5134" name="Picture 14" descr="Image result for react"/>
+                <p:cNvPicPr>
+                  <a:picLocks noChangeAspect="1" noChangeArrowheads="1"/>
+                </p:cNvPicPr>
+                <p:nvPr/>
+              </p:nvPicPr>
+              <p:blipFill rotWithShape="1">
+                <a:blip r:embed="rId6" cstate="print">
+                  <a:extLst>
+                    <a:ext uri="{28A0092B-C50C-407E-A947-70E740481C1C}">
+                      <a14:useLocalDpi xmlns:a14="http://schemas.microsoft.com/office/drawing/2010/main" val="0"/>
+                    </a:ext>
+                  </a:extLst>
+                </a:blip>
+                <a:srcRect l="19847" t="11190" r="20432" b="11013"/>
+                <a:stretch/>
+              </p:blipFill>
+              <p:spPr bwMode="auto">
+                <a:xfrm>
+                  <a:off x="10035012" y="1501637"/>
+                  <a:ext cx="1137684" cy="1047307"/>
+                </a:xfrm>
+                <a:prstGeom prst="rect">
+                  <a:avLst/>
+                </a:prstGeom>
+                <a:noFill/>
+                <a:extLst>
+                  <a:ext uri="{909E8E84-426E-40DD-AFC4-6F175D3DCCD1}">
+                    <a14:hiddenFill xmlns:a14="http://schemas.microsoft.com/office/drawing/2010/main">
+                      <a:solidFill>
+                        <a:srgbClr val="FFFFFF"/>
+                      </a:solidFill>
+                    </a14:hiddenFill>
+                  </a:ext>
+                </a:extLst>
+              </p:spPr>
+            </p:pic>
+            <p:sp>
+              <p:nvSpPr>
+                <p:cNvPr id="14" name="TextBox 13"/>
+                <p:cNvSpPr txBox="1"/>
+                <p:nvPr/>
+              </p:nvSpPr>
+              <p:spPr>
+                <a:xfrm>
+                  <a:off x="10250648" y="2468833"/>
+                  <a:ext cx="706412" cy="369332"/>
+                </a:xfrm>
+                <a:prstGeom prst="rect">
+                  <a:avLst/>
+                </a:prstGeom>
+                <a:noFill/>
+              </p:spPr>
+              <p:txBody>
+                <a:bodyPr wrap="none" rtlCol="0">
+                  <a:spAutoFit/>
+                </a:bodyPr>
+                <a:lstStyle/>
+                <a:p>
+                  <a:r>
+                    <a:rPr lang="en-US" dirty="0"/>
+                    <a:t>R</a:t>
+                  </a:r>
+                  <a:r>
+                    <a:rPr lang="en-US" dirty="0" smtClean="0"/>
+                    <a:t>eact</a:t>
+                  </a:r>
+                  <a:endParaRPr lang="en-US" dirty="0"/>
+                </a:p>
+              </p:txBody>
+            </p:sp>
+          </p:grpSp>
+          <p:grpSp>
+            <p:nvGrpSpPr>
+              <p:cNvPr id="17" name="Group 16"/>
+              <p:cNvGrpSpPr/>
+              <p:nvPr/>
+            </p:nvGrpSpPr>
+            <p:grpSpPr>
+              <a:xfrm>
+                <a:off x="8444876" y="2998281"/>
+                <a:ext cx="1252459" cy="1035694"/>
+                <a:chOff x="8837528" y="2425205"/>
+                <a:chExt cx="1252459" cy="1035694"/>
+              </a:xfrm>
+            </p:grpSpPr>
+            <p:pic>
+              <p:nvPicPr>
+                <p:cNvPr id="5132" name="Picture 12" descr="Image result for material ui"/>
+                <p:cNvPicPr>
+                  <a:picLocks noChangeAspect="1" noChangeArrowheads="1"/>
+                </p:cNvPicPr>
+                <p:nvPr/>
+              </p:nvPicPr>
+              <p:blipFill rotWithShape="1">
+                <a:blip r:embed="rId7" cstate="print">
+                  <a:extLst>
+                    <a:ext uri="{28A0092B-C50C-407E-A947-70E740481C1C}">
+                      <a14:useLocalDpi xmlns:a14="http://schemas.microsoft.com/office/drawing/2010/main" val="0"/>
+                    </a:ext>
+                  </a:extLst>
+                </a:blip>
+                <a:srcRect l="17405" t="24837" r="17851" b="23814"/>
+                <a:stretch/>
+              </p:blipFill>
+              <p:spPr bwMode="auto">
+                <a:xfrm>
+                  <a:off x="9022507" y="2425205"/>
+                  <a:ext cx="882502" cy="699915"/>
+                </a:xfrm>
+                <a:prstGeom prst="rect">
+                  <a:avLst/>
+                </a:prstGeom>
+                <a:noFill/>
+                <a:extLst>
+                  <a:ext uri="{909E8E84-426E-40DD-AFC4-6F175D3DCCD1}">
+                    <a14:hiddenFill xmlns:a14="http://schemas.microsoft.com/office/drawing/2010/main">
+                      <a:solidFill>
+                        <a:srgbClr val="FFFFFF"/>
+                      </a:solidFill>
+                    </a14:hiddenFill>
+                  </a:ext>
+                </a:extLst>
+              </p:spPr>
+            </p:pic>
+            <p:sp>
+              <p:nvSpPr>
+                <p:cNvPr id="16" name="TextBox 15"/>
+                <p:cNvSpPr txBox="1"/>
+                <p:nvPr/>
+              </p:nvSpPr>
+              <p:spPr>
+                <a:xfrm>
+                  <a:off x="8837528" y="3091567"/>
+                  <a:ext cx="1252459" cy="369332"/>
+                </a:xfrm>
+                <a:prstGeom prst="rect">
+                  <a:avLst/>
+                </a:prstGeom>
+                <a:noFill/>
+              </p:spPr>
+              <p:txBody>
+                <a:bodyPr wrap="none" rtlCol="0">
+                  <a:spAutoFit/>
+                </a:bodyPr>
+                <a:lstStyle/>
+                <a:p>
+                  <a:r>
+                    <a:rPr lang="en-US" dirty="0" smtClean="0"/>
+                    <a:t>Material-UI</a:t>
+                  </a:r>
+                  <a:endParaRPr lang="en-US" dirty="0"/>
+                </a:p>
+              </p:txBody>
+            </p:sp>
+          </p:grpSp>
+          <p:grpSp>
+            <p:nvGrpSpPr>
+              <p:cNvPr id="20" name="Group 19"/>
+              <p:cNvGrpSpPr/>
+              <p:nvPr/>
+            </p:nvGrpSpPr>
+            <p:grpSpPr>
+              <a:xfrm>
+                <a:off x="8523188" y="1599429"/>
+                <a:ext cx="1197059" cy="1191804"/>
+                <a:chOff x="7465229" y="3049663"/>
+                <a:chExt cx="1197059" cy="1191804"/>
+              </a:xfrm>
+            </p:grpSpPr>
+            <p:pic>
+              <p:nvPicPr>
+                <p:cNvPr id="28" name="Picture 24" descr="Image result for python language"/>
+                <p:cNvPicPr>
+                  <a:picLocks noChangeAspect="1" noChangeArrowheads="1"/>
+                </p:cNvPicPr>
+                <p:nvPr/>
+              </p:nvPicPr>
+              <p:blipFill rotWithShape="1">
+                <a:blip r:embed="rId8">
+                  <a:extLst>
+                    <a:ext uri="{28A0092B-C50C-407E-A947-70E740481C1C}">
+                      <a14:useLocalDpi xmlns:a14="http://schemas.microsoft.com/office/drawing/2010/main" val="0"/>
+                    </a:ext>
+                  </a:extLst>
+                </a:blip>
+                <a:srcRect l="13388" t="11212" r="13496" b="13439"/>
+                <a:stretch/>
+              </p:blipFill>
+              <p:spPr bwMode="auto">
+                <a:xfrm>
+                  <a:off x="7664707" y="3049663"/>
+                  <a:ext cx="798102" cy="822472"/>
+                </a:xfrm>
+                <a:prstGeom prst="rect">
+                  <a:avLst/>
+                </a:prstGeom>
+                <a:noFill/>
+                <a:extLst>
+                  <a:ext uri="{909E8E84-426E-40DD-AFC4-6F175D3DCCD1}">
+                    <a14:hiddenFill xmlns:a14="http://schemas.microsoft.com/office/drawing/2010/main">
+                      <a:solidFill>
+                        <a:srgbClr val="FFFFFF"/>
+                      </a:solidFill>
+                    </a14:hiddenFill>
+                  </a:ext>
+                </a:extLst>
+              </p:spPr>
+            </p:pic>
+            <p:sp>
+              <p:nvSpPr>
+                <p:cNvPr id="19" name="TextBox 18"/>
+                <p:cNvSpPr txBox="1"/>
+                <p:nvPr/>
+              </p:nvSpPr>
+              <p:spPr>
+                <a:xfrm>
+                  <a:off x="7465229" y="3872135"/>
+                  <a:ext cx="1197059" cy="369332"/>
+                </a:xfrm>
+                <a:prstGeom prst="rect">
+                  <a:avLst/>
+                </a:prstGeom>
+                <a:noFill/>
+              </p:spPr>
+              <p:txBody>
+                <a:bodyPr wrap="none" rtlCol="0">
+                  <a:spAutoFit/>
+                </a:bodyPr>
+                <a:lstStyle/>
+                <a:p>
+                  <a:pPr algn="ctr"/>
+                  <a:r>
+                    <a:rPr lang="en-US" dirty="0" smtClean="0"/>
+                    <a:t>Python 3.7</a:t>
+                  </a:r>
+                </a:p>
+              </p:txBody>
+            </p:sp>
+          </p:grpSp>
+        </p:grpSp>
+        <p:grpSp>
+          <p:nvGrpSpPr>
+            <p:cNvPr id="35" name="Group 34"/>
+            <p:cNvGrpSpPr/>
+            <p:nvPr/>
+          </p:nvGrpSpPr>
+          <p:grpSpPr>
             <a:xfrm>
-              <a:off x="10035012" y="1501637"/>
-              <a:ext cx="1137684" cy="1047307"/>
+              <a:off x="4376818" y="810193"/>
+              <a:ext cx="3200400" cy="5162122"/>
+              <a:chOff x="4376818" y="853210"/>
+              <a:chExt cx="3200400" cy="5162122"/>
             </a:xfrm>
-            <a:prstGeom prst="rect">
-              <a:avLst/>
-            </a:prstGeom>
-            <a:noFill/>
-            <a:extLst>
-              <a:ext uri="{909E8E84-426E-40DD-AFC4-6F175D3DCCD1}">
-                <a14:hiddenFill xmlns:a14="http://schemas.microsoft.com/office/drawing/2010/main">
-                  <a:solidFill>
-                    <a:srgbClr val="FFFFFF"/>
-                  </a:solidFill>
-                </a14:hiddenFill>
-              </a:ext>
-            </a:extLst>
-          </p:spPr>
-        </p:pic>
-        <p:sp>
-          <p:nvSpPr>
-            <p:cNvPr id="14" name="TextBox 13"/>
-            <p:cNvSpPr txBox="1"/>
-            <p:nvPr/>
-          </p:nvSpPr>
-          <p:spPr>
-            <a:xfrm>
-              <a:off x="10250648" y="2468833"/>
-              <a:ext cx="706412" cy="369332"/>
-            </a:xfrm>
-            <a:prstGeom prst="rect">
-              <a:avLst/>
-            </a:prstGeom>
-            <a:noFill/>
-          </p:spPr>
-          <p:txBody>
-            <a:bodyPr wrap="none" rtlCol="0">
-              <a:spAutoFit/>
-            </a:bodyPr>
-            <a:lstStyle/>
-            <a:p>
-              <a:r>
-                <a:rPr lang="en-US" dirty="0"/>
-                <a:t>R</a:t>
-              </a:r>
-              <a:r>
-                <a:rPr lang="en-US" dirty="0" smtClean="0"/>
-                <a:t>eact</a:t>
-              </a:r>
-              <a:endParaRPr lang="en-US" dirty="0"/>
-            </a:p>
-          </p:txBody>
-        </p:sp>
-      </p:grpSp>
-      <p:grpSp>
-        <p:nvGrpSpPr>
-          <p:cNvPr id="17" name="Group 16"/>
-          <p:cNvGrpSpPr/>
-          <p:nvPr/>
-        </p:nvGrpSpPr>
-        <p:grpSpPr>
-          <a:xfrm>
-            <a:off x="8276503" y="3036053"/>
-            <a:ext cx="1252459" cy="1035694"/>
-            <a:chOff x="8837528" y="2425205"/>
-            <a:chExt cx="1252459" cy="1035694"/>
-          </a:xfrm>
-        </p:grpSpPr>
-        <p:pic>
-          <p:nvPicPr>
-            <p:cNvPr id="5132" name="Picture 12" descr="Image result for material ui"/>
-            <p:cNvPicPr>
-              <a:picLocks noChangeAspect="1" noChangeArrowheads="1"/>
-            </p:cNvPicPr>
-            <p:nvPr/>
-          </p:nvPicPr>
-          <p:blipFill rotWithShape="1">
-            <a:blip r:embed="rId9" cstate="print">
+          </p:grpSpPr>
+          <p:sp>
+            <p:nvSpPr>
+              <p:cNvPr id="7" name="Rounded Rectangle 6"/>
+              <p:cNvSpPr/>
+              <p:nvPr/>
+            </p:nvSpPr>
+            <p:spPr>
+              <a:xfrm>
+                <a:off x="4376818" y="853210"/>
+                <a:ext cx="3200400" cy="5162122"/>
+              </a:xfrm>
+              <a:prstGeom prst="roundRect">
+                <a:avLst>
+                  <a:gd name="adj" fmla="val 8140"/>
+                </a:avLst>
+              </a:prstGeom>
+            </p:spPr>
+            <p:style>
+              <a:lnRef idx="2">
+                <a:schemeClr val="accent3"/>
+              </a:lnRef>
+              <a:fillRef idx="1">
+                <a:schemeClr val="lt1"/>
+              </a:fillRef>
+              <a:effectRef idx="0">
+                <a:schemeClr val="accent3"/>
+              </a:effectRef>
+              <a:fontRef idx="minor">
+                <a:schemeClr val="dk1"/>
+              </a:fontRef>
+            </p:style>
+            <p:txBody>
+              <a:bodyPr rtlCol="0" anchor="t"/>
+              <a:lstStyle/>
+              <a:p>
+                <a:pPr algn="ctr">
+                  <a:lnSpc>
+                    <a:spcPct val="150000"/>
+                  </a:lnSpc>
+                </a:pPr>
+                <a:r>
+                  <a:rPr lang="el-GR" b="1" dirty="0" smtClean="0"/>
+                  <a:t>π</a:t>
+                </a:r>
+                <a:r>
+                  <a:rPr lang="en-US" b="1" dirty="0" smtClean="0"/>
+                  <a:t>-Layer Intercommunication</a:t>
+                </a:r>
+              </a:p>
+            </p:txBody>
+          </p:sp>
+          <p:pic>
+            <p:nvPicPr>
+              <p:cNvPr id="5138" name="Picture 18" descr="Image result for pyserial"/>
+              <p:cNvPicPr>
+                <a:picLocks noChangeAspect="1" noChangeArrowheads="1"/>
+              </p:cNvPicPr>
+              <p:nvPr/>
+            </p:nvPicPr>
+            <p:blipFill>
+              <a:blip r:embed="rId9">
+                <a:extLst>
+                  <a:ext uri="{28A0092B-C50C-407E-A947-70E740481C1C}">
+                    <a14:useLocalDpi xmlns:a14="http://schemas.microsoft.com/office/drawing/2010/main" val="0"/>
+                  </a:ext>
+                </a:extLst>
+              </a:blip>
+              <a:srcRect/>
+              <a:stretch>
+                <a:fillRect/>
+              </a:stretch>
+            </p:blipFill>
+            <p:spPr bwMode="auto">
+              <a:xfrm>
+                <a:off x="5208026" y="3794147"/>
+                <a:ext cx="1537985" cy="836187"/>
+              </a:xfrm>
+              <a:prstGeom prst="rect">
+                <a:avLst/>
+              </a:prstGeom>
+              <a:noFill/>
               <a:extLst>
-                <a:ext uri="{28A0092B-C50C-407E-A947-70E740481C1C}">
-                  <a14:useLocalDpi xmlns:a14="http://schemas.microsoft.com/office/drawing/2010/main" val="0"/>
+                <a:ext uri="{909E8E84-426E-40DD-AFC4-6F175D3DCCD1}">
+                  <a14:hiddenFill xmlns:a14="http://schemas.microsoft.com/office/drawing/2010/main">
+                    <a:solidFill>
+                      <a:srgbClr val="FFFFFF"/>
+                    </a:solidFill>
+                  </a14:hiddenFill>
                 </a:ext>
               </a:extLst>
-            </a:blip>
-            <a:srcRect l="17405" t="24837" r="17851" b="23814"/>
-            <a:stretch/>
-          </p:blipFill>
-          <p:spPr bwMode="auto">
-            <a:xfrm>
-              <a:off x="9022507" y="2425205"/>
-              <a:ext cx="882502" cy="699915"/>
-            </a:xfrm>
-            <a:prstGeom prst="rect">
-              <a:avLst/>
-            </a:prstGeom>
-            <a:noFill/>
-            <a:extLst>
-              <a:ext uri="{909E8E84-426E-40DD-AFC4-6F175D3DCCD1}">
-                <a14:hiddenFill xmlns:a14="http://schemas.microsoft.com/office/drawing/2010/main">
-                  <a:solidFill>
-                    <a:srgbClr val="FFFFFF"/>
-                  </a:solidFill>
-                </a14:hiddenFill>
-              </a:ext>
-            </a:extLst>
-          </p:spPr>
-        </p:pic>
-        <p:sp>
-          <p:nvSpPr>
-            <p:cNvPr id="16" name="TextBox 15"/>
-            <p:cNvSpPr txBox="1"/>
-            <p:nvPr/>
-          </p:nvSpPr>
-          <p:spPr>
-            <a:xfrm>
-              <a:off x="8837528" y="3091567"/>
-              <a:ext cx="1252459" cy="369332"/>
-            </a:xfrm>
-            <a:prstGeom prst="rect">
-              <a:avLst/>
-            </a:prstGeom>
-            <a:noFill/>
-          </p:spPr>
-          <p:txBody>
-            <a:bodyPr wrap="none" rtlCol="0">
-              <a:spAutoFit/>
-            </a:bodyPr>
-            <a:lstStyle/>
-            <a:p>
-              <a:r>
-                <a:rPr lang="en-US" dirty="0" smtClean="0"/>
-                <a:t>Material-UI</a:t>
-              </a:r>
-              <a:endParaRPr lang="en-US" dirty="0"/>
-            </a:p>
-          </p:txBody>
-        </p:sp>
-      </p:grpSp>
-      <p:grpSp>
-        <p:nvGrpSpPr>
-          <p:cNvPr id="20" name="Group 19"/>
-          <p:cNvGrpSpPr/>
-          <p:nvPr/>
-        </p:nvGrpSpPr>
-        <p:grpSpPr>
-          <a:xfrm>
-            <a:off x="8354815" y="1602967"/>
-            <a:ext cx="1197059" cy="1191804"/>
-            <a:chOff x="7465229" y="3049663"/>
-            <a:chExt cx="1197059" cy="1191804"/>
-          </a:xfrm>
-        </p:grpSpPr>
-        <p:pic>
-          <p:nvPicPr>
-            <p:cNvPr id="28" name="Picture 24" descr="Image result for python language"/>
-            <p:cNvPicPr>
-              <a:picLocks noChangeAspect="1" noChangeArrowheads="1"/>
-            </p:cNvPicPr>
-            <p:nvPr/>
-          </p:nvPicPr>
-          <p:blipFill rotWithShape="1">
-            <a:blip r:embed="rId10">
+            </p:spPr>
+          </p:pic>
+          <p:pic>
+            <p:nvPicPr>
+              <p:cNvPr id="18" name="Picture 12" descr="http://zeromq.wdfiles.com/local--files/admin:css/logo.gif"/>
+              <p:cNvPicPr>
+                <a:picLocks noChangeAspect="1" noChangeArrowheads="1"/>
+              </p:cNvPicPr>
+              <p:nvPr/>
+            </p:nvPicPr>
+            <p:blipFill>
+              <a:blip r:embed="rId10" cstate="print">
+                <a:extLst>
+                  <a:ext uri="{28A0092B-C50C-407E-A947-70E740481C1C}">
+                    <a14:useLocalDpi xmlns:a14="http://schemas.microsoft.com/office/drawing/2010/main" val="0"/>
+                  </a:ext>
+                </a:extLst>
+              </a:blip>
+              <a:srcRect/>
+              <a:stretch>
+                <a:fillRect/>
+              </a:stretch>
+            </p:blipFill>
+            <p:spPr bwMode="auto">
+              <a:xfrm>
+                <a:off x="5206994" y="4999666"/>
+                <a:ext cx="1540049" cy="481014"/>
+              </a:xfrm>
+              <a:prstGeom prst="rect">
+                <a:avLst/>
+              </a:prstGeom>
+              <a:noFill/>
               <a:extLst>
-                <a:ext uri="{28A0092B-C50C-407E-A947-70E740481C1C}">
-                  <a14:useLocalDpi xmlns:a14="http://schemas.microsoft.com/office/drawing/2010/main" val="0"/>
+                <a:ext uri="{909E8E84-426E-40DD-AFC4-6F175D3DCCD1}">
+                  <a14:hiddenFill xmlns:a14="http://schemas.microsoft.com/office/drawing/2010/main">
+                    <a:solidFill>
+                      <a:srgbClr val="FFFFFF"/>
+                    </a:solidFill>
+                  </a14:hiddenFill>
                 </a:ext>
               </a:extLst>
-            </a:blip>
-            <a:srcRect l="13388" t="11212" r="13496" b="13439"/>
-            <a:stretch/>
-          </p:blipFill>
-          <p:spPr bwMode="auto">
+            </p:spPr>
+          </p:pic>
+          <p:grpSp>
+            <p:nvGrpSpPr>
+              <p:cNvPr id="32" name="Group 31"/>
+              <p:cNvGrpSpPr/>
+              <p:nvPr/>
+            </p:nvGrpSpPr>
+            <p:grpSpPr>
+              <a:xfrm>
+                <a:off x="5378489" y="1565571"/>
+                <a:ext cx="1197059" cy="1191804"/>
+                <a:chOff x="7465229" y="3049663"/>
+                <a:chExt cx="1197059" cy="1191804"/>
+              </a:xfrm>
+            </p:grpSpPr>
+            <p:pic>
+              <p:nvPicPr>
+                <p:cNvPr id="33" name="Picture 24" descr="Image result for python language"/>
+                <p:cNvPicPr>
+                  <a:picLocks noChangeAspect="1" noChangeArrowheads="1"/>
+                </p:cNvPicPr>
+                <p:nvPr/>
+              </p:nvPicPr>
+              <p:blipFill rotWithShape="1">
+                <a:blip r:embed="rId8">
+                  <a:extLst>
+                    <a:ext uri="{28A0092B-C50C-407E-A947-70E740481C1C}">
+                      <a14:useLocalDpi xmlns:a14="http://schemas.microsoft.com/office/drawing/2010/main" val="0"/>
+                    </a:ext>
+                  </a:extLst>
+                </a:blip>
+                <a:srcRect l="13388" t="11212" r="13496" b="13439"/>
+                <a:stretch/>
+              </p:blipFill>
+              <p:spPr bwMode="auto">
+                <a:xfrm>
+                  <a:off x="7664707" y="3049663"/>
+                  <a:ext cx="798102" cy="822472"/>
+                </a:xfrm>
+                <a:prstGeom prst="rect">
+                  <a:avLst/>
+                </a:prstGeom>
+                <a:noFill/>
+                <a:extLst>
+                  <a:ext uri="{909E8E84-426E-40DD-AFC4-6F175D3DCCD1}">
+                    <a14:hiddenFill xmlns:a14="http://schemas.microsoft.com/office/drawing/2010/main">
+                      <a:solidFill>
+                        <a:srgbClr val="FFFFFF"/>
+                      </a:solidFill>
+                    </a14:hiddenFill>
+                  </a:ext>
+                </a:extLst>
+              </p:spPr>
+            </p:pic>
+            <p:sp>
+              <p:nvSpPr>
+                <p:cNvPr id="34" name="TextBox 33"/>
+                <p:cNvSpPr txBox="1"/>
+                <p:nvPr/>
+              </p:nvSpPr>
+              <p:spPr>
+                <a:xfrm>
+                  <a:off x="7465229" y="3872135"/>
+                  <a:ext cx="1197059" cy="369332"/>
+                </a:xfrm>
+                <a:prstGeom prst="rect">
+                  <a:avLst/>
+                </a:prstGeom>
+                <a:noFill/>
+              </p:spPr>
+              <p:txBody>
+                <a:bodyPr wrap="none" rtlCol="0">
+                  <a:spAutoFit/>
+                </a:bodyPr>
+                <a:lstStyle/>
+                <a:p>
+                  <a:pPr algn="ctr"/>
+                  <a:r>
+                    <a:rPr lang="en-US" dirty="0" smtClean="0"/>
+                    <a:t>Python 3.7</a:t>
+                  </a:r>
+                </a:p>
+              </p:txBody>
+            </p:sp>
+          </p:grpSp>
+          <p:sp>
+            <p:nvSpPr>
+              <p:cNvPr id="22" name="TextBox 21"/>
+              <p:cNvSpPr txBox="1"/>
+              <p:nvPr/>
+            </p:nvSpPr>
+            <p:spPr>
+              <a:xfrm>
+                <a:off x="5127266" y="2911157"/>
+                <a:ext cx="1699504" cy="523220"/>
+              </a:xfrm>
+              <a:prstGeom prst="rect">
+                <a:avLst/>
+              </a:prstGeom>
+              <a:noFill/>
+            </p:spPr>
+            <p:txBody>
+              <a:bodyPr wrap="none" rtlCol="0">
+                <a:spAutoFit/>
+              </a:bodyPr>
+              <a:lstStyle/>
+              <a:p>
+                <a:pPr algn="ctr"/>
+                <a:r>
+                  <a:rPr lang="en-US" sz="2800" dirty="0" err="1" smtClean="0">
+                    <a:latin typeface="Lucida Console" panose="020B0609040504020204" pitchFamily="49" charset="0"/>
+                  </a:rPr>
+                  <a:t>asyncio</a:t>
+                </a:r>
+                <a:endParaRPr lang="en-US" sz="2800" dirty="0">
+                  <a:latin typeface="Lucida Console" panose="020B0609040504020204" pitchFamily="49" charset="0"/>
+                </a:endParaRPr>
+              </a:p>
+            </p:txBody>
+          </p:sp>
+        </p:grpSp>
+        <p:grpSp>
+          <p:nvGrpSpPr>
+            <p:cNvPr id="31" name="Group 30"/>
+            <p:cNvGrpSpPr/>
+            <p:nvPr/>
+          </p:nvGrpSpPr>
+          <p:grpSpPr>
             <a:xfrm>
-              <a:off x="7664707" y="3049663"/>
-              <a:ext cx="798102" cy="822472"/>
+              <a:off x="634277" y="810193"/>
+              <a:ext cx="3200400" cy="5162122"/>
+              <a:chOff x="753768" y="853210"/>
+              <a:chExt cx="3171014" cy="5162122"/>
             </a:xfrm>
-            <a:prstGeom prst="rect">
-              <a:avLst/>
-            </a:prstGeom>
-            <a:noFill/>
-            <a:extLst>
-              <a:ext uri="{909E8E84-426E-40DD-AFC4-6F175D3DCCD1}">
-                <a14:hiddenFill xmlns:a14="http://schemas.microsoft.com/office/drawing/2010/main">
-                  <a:solidFill>
-                    <a:srgbClr val="FFFFFF"/>
-                  </a:solidFill>
-                </a14:hiddenFill>
-              </a:ext>
-            </a:extLst>
-          </p:spPr>
-        </p:pic>
-        <p:sp>
-          <p:nvSpPr>
-            <p:cNvPr id="19" name="TextBox 18"/>
-            <p:cNvSpPr txBox="1"/>
-            <p:nvPr/>
-          </p:nvSpPr>
-          <p:spPr>
-            <a:xfrm>
-              <a:off x="7465229" y="3872135"/>
-              <a:ext cx="1197059" cy="369332"/>
-            </a:xfrm>
-            <a:prstGeom prst="rect">
-              <a:avLst/>
-            </a:prstGeom>
-            <a:noFill/>
-          </p:spPr>
-          <p:txBody>
-            <a:bodyPr wrap="none" rtlCol="0">
-              <a:spAutoFit/>
-            </a:bodyPr>
-            <a:lstStyle/>
-            <a:p>
-              <a:pPr algn="ctr"/>
-              <a:r>
-                <a:rPr lang="en-US" dirty="0" smtClean="0"/>
-                <a:t>Python 3.7</a:t>
-              </a:r>
-            </a:p>
-          </p:txBody>
-        </p:sp>
+          </p:grpSpPr>
+          <p:sp>
+            <p:nvSpPr>
+              <p:cNvPr id="6" name="Rounded Rectangle 5"/>
+              <p:cNvSpPr/>
+              <p:nvPr/>
+            </p:nvSpPr>
+            <p:spPr>
+              <a:xfrm>
+                <a:off x="753768" y="853210"/>
+                <a:ext cx="3171014" cy="5162122"/>
+              </a:xfrm>
+              <a:prstGeom prst="roundRect">
+                <a:avLst>
+                  <a:gd name="adj" fmla="val 8140"/>
+                </a:avLst>
+              </a:prstGeom>
+            </p:spPr>
+            <p:style>
+              <a:lnRef idx="2">
+                <a:schemeClr val="accent3"/>
+              </a:lnRef>
+              <a:fillRef idx="1">
+                <a:schemeClr val="lt1"/>
+              </a:fillRef>
+              <a:effectRef idx="0">
+                <a:schemeClr val="accent3"/>
+              </a:effectRef>
+              <a:fontRef idx="minor">
+                <a:schemeClr val="dk1"/>
+              </a:fontRef>
+            </p:style>
+            <p:txBody>
+              <a:bodyPr rtlCol="0" anchor="t"/>
+              <a:lstStyle/>
+              <a:p>
+                <a:pPr algn="ctr">
+                  <a:lnSpc>
+                    <a:spcPct val="150000"/>
+                  </a:lnSpc>
+                </a:pPr>
+                <a:r>
+                  <a:rPr lang="en-US" b="1" dirty="0" smtClean="0"/>
+                  <a:t>A-Layer Sensor </a:t>
+                </a:r>
+                <a:r>
+                  <a:rPr lang="en-US" b="1" dirty="0" smtClean="0"/>
+                  <a:t>Nodes</a:t>
+                </a:r>
+                <a:endParaRPr lang="en-US" b="1" dirty="0"/>
+              </a:p>
+            </p:txBody>
+          </p:sp>
+          <p:grpSp>
+            <p:nvGrpSpPr>
+              <p:cNvPr id="2" name="Group 1"/>
+              <p:cNvGrpSpPr/>
+              <p:nvPr/>
+            </p:nvGrpSpPr>
+            <p:grpSpPr>
+              <a:xfrm>
+                <a:off x="936665" y="1565571"/>
+                <a:ext cx="1491177" cy="884209"/>
+                <a:chOff x="2047564" y="2770947"/>
+                <a:chExt cx="1491177" cy="884209"/>
+              </a:xfrm>
+            </p:grpSpPr>
+            <p:pic>
+              <p:nvPicPr>
+                <p:cNvPr id="1026" name="Picture 2" descr="Image result for arduino logo"/>
+                <p:cNvPicPr>
+                  <a:picLocks noChangeAspect="1" noChangeArrowheads="1"/>
+                </p:cNvPicPr>
+                <p:nvPr/>
+              </p:nvPicPr>
+              <p:blipFill rotWithShape="1">
+                <a:blip r:embed="rId11" cstate="print">
+                  <a:extLst>
+                    <a:ext uri="{28A0092B-C50C-407E-A947-70E740481C1C}">
+                      <a14:useLocalDpi xmlns:a14="http://schemas.microsoft.com/office/drawing/2010/main" val="0"/>
+                    </a:ext>
+                  </a:extLst>
+                </a:blip>
+                <a:srcRect b="28506"/>
+                <a:stretch/>
+              </p:blipFill>
+              <p:spPr bwMode="auto">
+                <a:xfrm>
+                  <a:off x="2193222" y="2770947"/>
+                  <a:ext cx="1195650" cy="581699"/>
+                </a:xfrm>
+                <a:prstGeom prst="rect">
+                  <a:avLst/>
+                </a:prstGeom>
+                <a:noFill/>
+                <a:extLst>
+                  <a:ext uri="{909E8E84-426E-40DD-AFC4-6F175D3DCCD1}">
+                    <a14:hiddenFill xmlns:a14="http://schemas.microsoft.com/office/drawing/2010/main">
+                      <a:solidFill>
+                        <a:srgbClr val="FFFFFF"/>
+                      </a:solidFill>
+                    </a14:hiddenFill>
+                  </a:ext>
+                </a:extLst>
+              </p:spPr>
+            </p:pic>
+            <p:sp>
+              <p:nvSpPr>
+                <p:cNvPr id="30" name="TextBox 29"/>
+                <p:cNvSpPr txBox="1"/>
+                <p:nvPr/>
+              </p:nvSpPr>
+              <p:spPr>
+                <a:xfrm>
+                  <a:off x="2047564" y="3285824"/>
+                  <a:ext cx="1491177" cy="369332"/>
+                </a:xfrm>
+                <a:prstGeom prst="rect">
+                  <a:avLst/>
+                </a:prstGeom>
+                <a:noFill/>
+              </p:spPr>
+              <p:txBody>
+                <a:bodyPr wrap="none" rtlCol="0">
+                  <a:spAutoFit/>
+                </a:bodyPr>
+                <a:lstStyle/>
+                <a:p>
+                  <a:pPr algn="ctr"/>
+                  <a:r>
+                    <a:rPr lang="en-US" dirty="0" smtClean="0"/>
+                    <a:t>Arduino Nano</a:t>
+                  </a:r>
+                  <a:endParaRPr lang="en-US" dirty="0" smtClean="0"/>
+                </a:p>
+              </p:txBody>
+            </p:sp>
+          </p:grpSp>
+          <p:pic>
+            <p:nvPicPr>
+              <p:cNvPr id="10" name="Picture 9"/>
+              <p:cNvPicPr>
+                <a:picLocks noChangeAspect="1"/>
+              </p:cNvPicPr>
+              <p:nvPr/>
+            </p:nvPicPr>
+            <p:blipFill>
+              <a:blip r:embed="rId12"/>
+              <a:stretch>
+                <a:fillRect/>
+              </a:stretch>
+            </p:blipFill>
+            <p:spPr>
+              <a:xfrm>
+                <a:off x="2601998" y="1554569"/>
+                <a:ext cx="1143588" cy="867921"/>
+              </a:xfrm>
+              <a:prstGeom prst="rect">
+                <a:avLst/>
+              </a:prstGeom>
+            </p:spPr>
+          </p:pic>
+          <p:grpSp>
+            <p:nvGrpSpPr>
+              <p:cNvPr id="26" name="Group 25"/>
+              <p:cNvGrpSpPr/>
+              <p:nvPr/>
+            </p:nvGrpSpPr>
+            <p:grpSpPr>
+              <a:xfrm>
+                <a:off x="1807227" y="2745945"/>
+                <a:ext cx="1041641" cy="1264322"/>
+                <a:chOff x="1259702" y="4433522"/>
+                <a:chExt cx="1041641" cy="1264322"/>
+              </a:xfrm>
+            </p:grpSpPr>
+            <p:pic>
+              <p:nvPicPr>
+                <p:cNvPr id="25" name="Picture 24"/>
+                <p:cNvPicPr>
+                  <a:picLocks noChangeAspect="1"/>
+                </p:cNvPicPr>
+                <p:nvPr/>
+              </p:nvPicPr>
+              <p:blipFill>
+                <a:blip r:embed="rId13"/>
+                <a:stretch>
+                  <a:fillRect/>
+                </a:stretch>
+              </p:blipFill>
+              <p:spPr>
+                <a:xfrm>
+                  <a:off x="1259702" y="4433522"/>
+                  <a:ext cx="1041641" cy="914390"/>
+                </a:xfrm>
+                <a:prstGeom prst="rect">
+                  <a:avLst/>
+                </a:prstGeom>
+              </p:spPr>
+            </p:pic>
+            <p:sp>
+              <p:nvSpPr>
+                <p:cNvPr id="40" name="TextBox 39"/>
+                <p:cNvSpPr txBox="1"/>
+                <p:nvPr/>
+              </p:nvSpPr>
+              <p:spPr>
+                <a:xfrm>
+                  <a:off x="1394839" y="5328512"/>
+                  <a:ext cx="771366" cy="369332"/>
+                </a:xfrm>
+                <a:prstGeom prst="rect">
+                  <a:avLst/>
+                </a:prstGeom>
+                <a:noFill/>
+              </p:spPr>
+              <p:txBody>
+                <a:bodyPr wrap="none" rtlCol="0">
+                  <a:spAutoFit/>
+                </a:bodyPr>
+                <a:lstStyle/>
+                <a:p>
+                  <a:pPr algn="ctr"/>
+                  <a:r>
+                    <a:rPr lang="en-US" dirty="0" smtClean="0"/>
+                    <a:t>nRF24</a:t>
+                  </a:r>
+                  <a:endParaRPr lang="en-US" dirty="0" smtClean="0"/>
+                </a:p>
+              </p:txBody>
+            </p:sp>
+          </p:grpSp>
+          <p:grpSp>
+            <p:nvGrpSpPr>
+              <p:cNvPr id="27" name="Group 26"/>
+              <p:cNvGrpSpPr/>
+              <p:nvPr/>
+            </p:nvGrpSpPr>
+            <p:grpSpPr>
+              <a:xfrm>
+                <a:off x="936665" y="4361646"/>
+                <a:ext cx="1259512" cy="1283089"/>
+                <a:chOff x="3252445" y="4434935"/>
+                <a:chExt cx="1259512" cy="1283089"/>
+              </a:xfrm>
+            </p:grpSpPr>
+            <p:pic>
+              <p:nvPicPr>
+                <p:cNvPr id="1042" name="Picture 18" descr="Image result for pir sensor"/>
+                <p:cNvPicPr>
+                  <a:picLocks noChangeAspect="1" noChangeArrowheads="1"/>
+                </p:cNvPicPr>
+                <p:nvPr/>
+              </p:nvPicPr>
+              <p:blipFill>
+                <a:blip r:embed="rId14" cstate="print">
+                  <a:extLst>
+                    <a:ext uri="{28A0092B-C50C-407E-A947-70E740481C1C}">
+                      <a14:useLocalDpi xmlns:a14="http://schemas.microsoft.com/office/drawing/2010/main" val="0"/>
+                    </a:ext>
+                  </a:extLst>
+                </a:blip>
+                <a:srcRect/>
+                <a:stretch>
+                  <a:fillRect/>
+                </a:stretch>
+              </p:blipFill>
+              <p:spPr bwMode="auto">
+                <a:xfrm>
+                  <a:off x="3352731" y="4434935"/>
+                  <a:ext cx="1058941" cy="967186"/>
+                </a:xfrm>
+                <a:prstGeom prst="rect">
+                  <a:avLst/>
+                </a:prstGeom>
+                <a:noFill/>
+                <a:extLst>
+                  <a:ext uri="{909E8E84-426E-40DD-AFC4-6F175D3DCCD1}">
+                    <a14:hiddenFill xmlns:a14="http://schemas.microsoft.com/office/drawing/2010/main">
+                      <a:solidFill>
+                        <a:srgbClr val="FFFFFF"/>
+                      </a:solidFill>
+                    </a14:hiddenFill>
+                  </a:ext>
+                </a:extLst>
+              </p:spPr>
+            </p:pic>
+            <p:sp>
+              <p:nvSpPr>
+                <p:cNvPr id="45" name="TextBox 44"/>
+                <p:cNvSpPr txBox="1"/>
+                <p:nvPr/>
+              </p:nvSpPr>
+              <p:spPr>
+                <a:xfrm>
+                  <a:off x="3252445" y="5348692"/>
+                  <a:ext cx="1259512" cy="369332"/>
+                </a:xfrm>
+                <a:prstGeom prst="rect">
+                  <a:avLst/>
+                </a:prstGeom>
+                <a:noFill/>
+              </p:spPr>
+              <p:txBody>
+                <a:bodyPr wrap="none" rtlCol="0">
+                  <a:spAutoFit/>
+                </a:bodyPr>
+                <a:lstStyle/>
+                <a:p>
+                  <a:pPr algn="ctr"/>
+                  <a:r>
+                    <a:rPr lang="en-US" dirty="0" smtClean="0"/>
+                    <a:t>PIR Sensors</a:t>
+                  </a:r>
+                  <a:endParaRPr lang="en-US" dirty="0" smtClean="0"/>
+                </a:p>
+              </p:txBody>
+            </p:sp>
+          </p:grpSp>
+          <p:grpSp>
+            <p:nvGrpSpPr>
+              <p:cNvPr id="29" name="Group 28"/>
+              <p:cNvGrpSpPr/>
+              <p:nvPr/>
+            </p:nvGrpSpPr>
+            <p:grpSpPr>
+              <a:xfrm>
+                <a:off x="2515308" y="4429757"/>
+                <a:ext cx="1291246" cy="1277214"/>
+                <a:chOff x="4017488" y="4000882"/>
+                <a:chExt cx="1291246" cy="1277214"/>
+              </a:xfrm>
+            </p:grpSpPr>
+            <p:pic>
+              <p:nvPicPr>
+                <p:cNvPr id="1044" name="Picture 20" descr="Image result for acoustic sensor"/>
+                <p:cNvPicPr>
+                  <a:picLocks noChangeAspect="1" noChangeArrowheads="1"/>
+                </p:cNvPicPr>
+                <p:nvPr/>
+              </p:nvPicPr>
+              <p:blipFill rotWithShape="1">
+                <a:blip r:embed="rId15" cstate="print">
+                  <a:extLst>
+                    <a:ext uri="{28A0092B-C50C-407E-A947-70E740481C1C}">
+                      <a14:useLocalDpi xmlns:a14="http://schemas.microsoft.com/office/drawing/2010/main" val="0"/>
+                    </a:ext>
+                  </a:extLst>
+                </a:blip>
+                <a:srcRect t="22768" b="21187"/>
+                <a:stretch/>
+              </p:blipFill>
+              <p:spPr bwMode="auto">
+                <a:xfrm>
+                  <a:off x="4017488" y="4000882"/>
+                  <a:ext cx="1291246" cy="723684"/>
+                </a:xfrm>
+                <a:prstGeom prst="rect">
+                  <a:avLst/>
+                </a:prstGeom>
+                <a:noFill/>
+                <a:extLst>
+                  <a:ext uri="{909E8E84-426E-40DD-AFC4-6F175D3DCCD1}">
+                    <a14:hiddenFill xmlns:a14="http://schemas.microsoft.com/office/drawing/2010/main">
+                      <a:solidFill>
+                        <a:srgbClr val="FFFFFF"/>
+                      </a:solidFill>
+                    </a14:hiddenFill>
+                  </a:ext>
+                </a:extLst>
+              </p:spPr>
+            </p:pic>
+            <p:sp>
+              <p:nvSpPr>
+                <p:cNvPr id="47" name="TextBox 46"/>
+                <p:cNvSpPr txBox="1"/>
+                <p:nvPr/>
+              </p:nvSpPr>
+              <p:spPr>
+                <a:xfrm>
+                  <a:off x="4177082" y="4631765"/>
+                  <a:ext cx="972061" cy="646331"/>
+                </a:xfrm>
+                <a:prstGeom prst="rect">
+                  <a:avLst/>
+                </a:prstGeom>
+                <a:noFill/>
+              </p:spPr>
+              <p:txBody>
+                <a:bodyPr wrap="none" rtlCol="0">
+                  <a:spAutoFit/>
+                </a:bodyPr>
+                <a:lstStyle/>
+                <a:p>
+                  <a:pPr algn="ctr"/>
+                  <a:r>
+                    <a:rPr lang="en-US" dirty="0" smtClean="0"/>
+                    <a:t>Acoustic</a:t>
+                  </a:r>
+                </a:p>
+                <a:p>
+                  <a:pPr algn="ctr"/>
+                  <a:r>
+                    <a:rPr lang="en-US" dirty="0" smtClean="0"/>
+                    <a:t>Sensors</a:t>
+                  </a:r>
+                  <a:endParaRPr lang="en-US" dirty="0" smtClean="0"/>
+                </a:p>
+              </p:txBody>
+            </p:sp>
+          </p:grpSp>
+        </p:grpSp>
       </p:grpSp>
-      <p:grpSp>
-        <p:nvGrpSpPr>
-          <p:cNvPr id="32" name="Group 31"/>
-          <p:cNvGrpSpPr/>
-          <p:nvPr/>
-        </p:nvGrpSpPr>
-        <p:grpSpPr>
-          <a:xfrm>
-            <a:off x="5244476" y="1615553"/>
-            <a:ext cx="1197059" cy="1191804"/>
-            <a:chOff x="7465229" y="3049663"/>
-            <a:chExt cx="1197059" cy="1191804"/>
-          </a:xfrm>
-        </p:grpSpPr>
-        <p:pic>
-          <p:nvPicPr>
-            <p:cNvPr id="33" name="Picture 24" descr="Image result for python language"/>
-            <p:cNvPicPr>
-              <a:picLocks noChangeAspect="1" noChangeArrowheads="1"/>
-            </p:cNvPicPr>
-            <p:nvPr/>
-          </p:nvPicPr>
-          <p:blipFill rotWithShape="1">
-            <a:blip r:embed="rId10">
-              <a:extLst>
-                <a:ext uri="{28A0092B-C50C-407E-A947-70E740481C1C}">
-                  <a14:useLocalDpi xmlns:a14="http://schemas.microsoft.com/office/drawing/2010/main" val="0"/>
-                </a:ext>
-              </a:extLst>
-            </a:blip>
-            <a:srcRect l="13388" t="11212" r="13496" b="13439"/>
-            <a:stretch/>
-          </p:blipFill>
-          <p:spPr bwMode="auto">
-            <a:xfrm>
-              <a:off x="7664707" y="3049663"/>
-              <a:ext cx="798102" cy="822472"/>
-            </a:xfrm>
-            <a:prstGeom prst="rect">
-              <a:avLst/>
-            </a:prstGeom>
-            <a:noFill/>
-            <a:extLst>
-              <a:ext uri="{909E8E84-426E-40DD-AFC4-6F175D3DCCD1}">
-                <a14:hiddenFill xmlns:a14="http://schemas.microsoft.com/office/drawing/2010/main">
-                  <a:solidFill>
-                    <a:srgbClr val="FFFFFF"/>
-                  </a:solidFill>
-                </a14:hiddenFill>
-              </a:ext>
-            </a:extLst>
-          </p:spPr>
-        </p:pic>
-        <p:sp>
-          <p:nvSpPr>
-            <p:cNvPr id="34" name="TextBox 33"/>
-            <p:cNvSpPr txBox="1"/>
-            <p:nvPr/>
-          </p:nvSpPr>
-          <p:spPr>
-            <a:xfrm>
-              <a:off x="7465229" y="3872135"/>
-              <a:ext cx="1197059" cy="369332"/>
-            </a:xfrm>
-            <a:prstGeom prst="rect">
-              <a:avLst/>
-            </a:prstGeom>
-            <a:noFill/>
-          </p:spPr>
-          <p:txBody>
-            <a:bodyPr wrap="none" rtlCol="0">
-              <a:spAutoFit/>
-            </a:bodyPr>
-            <a:lstStyle/>
-            <a:p>
-              <a:pPr algn="ctr"/>
-              <a:r>
-                <a:rPr lang="en-US" dirty="0" smtClean="0"/>
-                <a:t>Python 3.7</a:t>
-              </a:r>
-            </a:p>
-          </p:txBody>
-        </p:sp>
-      </p:grpSp>
-      <p:sp>
-        <p:nvSpPr>
-          <p:cNvPr id="22" name="TextBox 21"/>
-          <p:cNvSpPr txBox="1"/>
-          <p:nvPr/>
-        </p:nvSpPr>
-        <p:spPr>
-          <a:xfrm>
-            <a:off x="5244476" y="2961139"/>
-            <a:ext cx="1265026" cy="523220"/>
-          </a:xfrm>
-          <a:prstGeom prst="rect">
-            <a:avLst/>
-          </a:prstGeom>
-          <a:noFill/>
-        </p:spPr>
-        <p:txBody>
-          <a:bodyPr wrap="none" rtlCol="0">
-            <a:spAutoFit/>
-          </a:bodyPr>
-          <a:lstStyle/>
-          <a:p>
-            <a:pPr algn="ctr"/>
-            <a:r>
-              <a:rPr lang="en-US" sz="2800" dirty="0" err="1" smtClean="0"/>
-              <a:t>asyncio</a:t>
-            </a:r>
-            <a:endParaRPr lang="en-US" sz="2800" dirty="0"/>
-          </a:p>
-        </p:txBody>
-      </p:sp>
     </p:spTree>
     <p:extLst>
       <p:ext uri="{BB962C8B-B14F-4D97-AF65-F5344CB8AC3E}">
@@ -8887,8 +9503,8 @@
         </p:nvSpPr>
         <p:spPr>
           <a:xfrm>
-            <a:off x="3381153" y="2519916"/>
-            <a:ext cx="2171877" cy="369332"/>
+            <a:off x="1568305" y="3776488"/>
+            <a:ext cx="2678233" cy="1200329"/>
           </a:xfrm>
           <a:prstGeom prst="rect">
             <a:avLst/>
@@ -8901,14 +9517,795 @@
           </a:bodyPr>
           <a:lstStyle/>
           <a:p>
+            <a:pPr algn="ctr"/>
             <a:r>
-              <a:rPr lang="en-US" dirty="0" smtClean="0"/>
-              <a:t>Routing Optimization</a:t>
+              <a:rPr lang="en-US" sz="3600" b="1" dirty="0" smtClean="0"/>
+              <a:t>Routing</a:t>
             </a:r>
-            <a:endParaRPr lang="en-US" dirty="0"/>
+          </a:p>
+          <a:p>
+            <a:pPr algn="ctr"/>
+            <a:r>
+              <a:rPr lang="en-US" sz="3600" b="1" dirty="0" smtClean="0"/>
+              <a:t>Optimization</a:t>
+            </a:r>
+            <a:endParaRPr lang="en-US" sz="3600" b="1" dirty="0"/>
           </a:p>
         </p:txBody>
       </p:sp>
+      <p:sp>
+        <p:nvSpPr>
+          <p:cNvPr id="2" name="TextBox 1"/>
+          <p:cNvSpPr txBox="1"/>
+          <p:nvPr/>
+        </p:nvSpPr>
+        <p:spPr>
+          <a:xfrm>
+            <a:off x="8770880" y="3776488"/>
+            <a:ext cx="1852815" cy="1200329"/>
+          </a:xfrm>
+          <a:prstGeom prst="rect">
+            <a:avLst/>
+          </a:prstGeom>
+          <a:noFill/>
+        </p:spPr>
+        <p:txBody>
+          <a:bodyPr wrap="none" rtlCol="0">
+            <a:spAutoFit/>
+          </a:bodyPr>
+          <a:lstStyle/>
+          <a:p>
+            <a:pPr algn="ctr"/>
+            <a:r>
+              <a:rPr lang="en-US" sz="3600" b="1" dirty="0" smtClean="0">
+                <a:latin typeface="Calibri" panose="020F0502020204030204" pitchFamily="34" charset="0"/>
+                <a:cs typeface="Calibri" panose="020F0502020204030204" pitchFamily="34" charset="0"/>
+              </a:rPr>
+              <a:t>Network</a:t>
+            </a:r>
+          </a:p>
+          <a:p>
+            <a:pPr algn="ctr"/>
+            <a:r>
+              <a:rPr lang="en-US" sz="3600" b="1" dirty="0" smtClean="0">
+                <a:latin typeface="Calibri" panose="020F0502020204030204" pitchFamily="34" charset="0"/>
+                <a:cs typeface="Calibri" panose="020F0502020204030204" pitchFamily="34" charset="0"/>
+              </a:rPr>
+              <a:t>Security</a:t>
+            </a:r>
+            <a:endParaRPr lang="en-US" sz="3600" b="1" dirty="0">
+              <a:latin typeface="Calibri" panose="020F0502020204030204" pitchFamily="34" charset="0"/>
+              <a:cs typeface="Calibri" panose="020F0502020204030204" pitchFamily="34" charset="0"/>
+            </a:endParaRPr>
+          </a:p>
+        </p:txBody>
+      </p:sp>
+      <p:sp>
+        <p:nvSpPr>
+          <p:cNvPr id="3" name="TextBox 2"/>
+          <p:cNvSpPr txBox="1"/>
+          <p:nvPr/>
+        </p:nvSpPr>
+        <p:spPr>
+          <a:xfrm>
+            <a:off x="5084312" y="3776488"/>
+            <a:ext cx="2848793" cy="1200329"/>
+          </a:xfrm>
+          <a:prstGeom prst="rect">
+            <a:avLst/>
+          </a:prstGeom>
+          <a:noFill/>
+        </p:spPr>
+        <p:txBody>
+          <a:bodyPr wrap="none" rtlCol="0">
+            <a:spAutoFit/>
+          </a:bodyPr>
+          <a:lstStyle/>
+          <a:p>
+            <a:pPr algn="ctr"/>
+            <a:r>
+              <a:rPr lang="en-US" sz="3600" b="1" dirty="0" smtClean="0"/>
+              <a:t>Administrator</a:t>
+            </a:r>
+          </a:p>
+          <a:p>
+            <a:pPr algn="ctr"/>
+            <a:r>
+              <a:rPr lang="en-US" sz="3600" b="1" dirty="0" smtClean="0"/>
+              <a:t>Control Panel</a:t>
+            </a:r>
+            <a:endParaRPr lang="en-US" sz="3600" b="1" dirty="0"/>
+          </a:p>
+        </p:txBody>
+      </p:sp>
+      <p:pic>
+        <p:nvPicPr>
+          <p:cNvPr id="8" name="Picture 7"/>
+          <p:cNvPicPr>
+            <a:picLocks noChangeAspect="1"/>
+          </p:cNvPicPr>
+          <p:nvPr/>
+        </p:nvPicPr>
+        <p:blipFill>
+          <a:blip r:embed="rId3"/>
+          <a:stretch>
+            <a:fillRect/>
+          </a:stretch>
+        </p:blipFill>
+        <p:spPr>
+          <a:xfrm>
+            <a:off x="5427938" y="1685101"/>
+            <a:ext cx="2161540" cy="2103120"/>
+          </a:xfrm>
+          <a:prstGeom prst="rect">
+            <a:avLst/>
+          </a:prstGeom>
+        </p:spPr>
+      </p:pic>
+      <p:pic>
+        <p:nvPicPr>
+          <p:cNvPr id="2054" name="Picture 6" descr="Image result for firewall icon"/>
+          <p:cNvPicPr>
+            <a:picLocks noChangeAspect="1" noChangeArrowheads="1"/>
+          </p:cNvPicPr>
+          <p:nvPr/>
+        </p:nvPicPr>
+        <p:blipFill>
+          <a:blip r:embed="rId4" cstate="print">
+            <a:extLst>
+              <a:ext uri="{28A0092B-C50C-407E-A947-70E740481C1C}">
+                <a14:useLocalDpi xmlns:a14="http://schemas.microsoft.com/office/drawing/2010/main" val="0"/>
+              </a:ext>
+            </a:extLst>
+          </a:blip>
+          <a:srcRect/>
+          <a:stretch>
+            <a:fillRect/>
+          </a:stretch>
+        </p:blipFill>
+        <p:spPr bwMode="auto">
+          <a:xfrm>
+            <a:off x="8770878" y="1685101"/>
+            <a:ext cx="1841302" cy="2103120"/>
+          </a:xfrm>
+          <a:prstGeom prst="rect">
+            <a:avLst/>
+          </a:prstGeom>
+          <a:noFill/>
+          <a:extLst>
+            <a:ext uri="{909E8E84-426E-40DD-AFC4-6F175D3DCCD1}">
+              <a14:hiddenFill xmlns:a14="http://schemas.microsoft.com/office/drawing/2010/main">
+                <a:solidFill>
+                  <a:srgbClr val="FFFFFF"/>
+                </a:solidFill>
+              </a14:hiddenFill>
+            </a:ext>
+          </a:extLst>
+        </p:spPr>
+      </p:pic>
+      <p:grpSp>
+        <p:nvGrpSpPr>
+          <p:cNvPr id="2059" name="Group 2058"/>
+          <p:cNvGrpSpPr/>
+          <p:nvPr/>
+        </p:nvGrpSpPr>
+        <p:grpSpPr>
+          <a:xfrm>
+            <a:off x="1776654" y="1782705"/>
+            <a:ext cx="2261533" cy="1907912"/>
+            <a:chOff x="1197935" y="1389306"/>
+            <a:chExt cx="2777995" cy="2343618"/>
+          </a:xfrm>
+        </p:grpSpPr>
+        <p:sp>
+          <p:nvSpPr>
+            <p:cNvPr id="9" name="Oval 8"/>
+            <p:cNvSpPr/>
+            <p:nvPr/>
+          </p:nvSpPr>
+          <p:spPr>
+            <a:xfrm>
+              <a:off x="1945422" y="2035335"/>
+              <a:ext cx="430686" cy="430686"/>
+            </a:xfrm>
+            <a:prstGeom prst="ellipse">
+              <a:avLst/>
+            </a:prstGeom>
+          </p:spPr>
+          <p:style>
+            <a:lnRef idx="2">
+              <a:schemeClr val="dk1">
+                <a:shade val="50000"/>
+              </a:schemeClr>
+            </a:lnRef>
+            <a:fillRef idx="1">
+              <a:schemeClr val="dk1"/>
+            </a:fillRef>
+            <a:effectRef idx="0">
+              <a:schemeClr val="dk1"/>
+            </a:effectRef>
+            <a:fontRef idx="minor">
+              <a:schemeClr val="lt1"/>
+            </a:fontRef>
+          </p:style>
+          <p:txBody>
+            <a:bodyPr rtlCol="0" anchor="ctr"/>
+            <a:lstStyle/>
+            <a:p>
+              <a:pPr algn="ctr"/>
+              <a:endParaRPr lang="en-US"/>
+            </a:p>
+          </p:txBody>
+        </p:sp>
+        <p:sp>
+          <p:nvSpPr>
+            <p:cNvPr id="13" name="Oval 12"/>
+            <p:cNvSpPr/>
+            <p:nvPr/>
+          </p:nvSpPr>
+          <p:spPr>
+            <a:xfrm>
+              <a:off x="3216202" y="1415308"/>
+              <a:ext cx="430686" cy="430686"/>
+            </a:xfrm>
+            <a:prstGeom prst="ellipse">
+              <a:avLst/>
+            </a:prstGeom>
+          </p:spPr>
+          <p:style>
+            <a:lnRef idx="2">
+              <a:schemeClr val="dk1">
+                <a:shade val="50000"/>
+              </a:schemeClr>
+            </a:lnRef>
+            <a:fillRef idx="1">
+              <a:schemeClr val="dk1"/>
+            </a:fillRef>
+            <a:effectRef idx="0">
+              <a:schemeClr val="dk1"/>
+            </a:effectRef>
+            <a:fontRef idx="minor">
+              <a:schemeClr val="lt1"/>
+            </a:fontRef>
+          </p:style>
+          <p:txBody>
+            <a:bodyPr rtlCol="0" anchor="ctr"/>
+            <a:lstStyle/>
+            <a:p>
+              <a:pPr algn="ctr"/>
+              <a:endParaRPr lang="en-US"/>
+            </a:p>
+          </p:txBody>
+        </p:sp>
+        <p:sp>
+          <p:nvSpPr>
+            <p:cNvPr id="14" name="Oval 13"/>
+            <p:cNvSpPr/>
+            <p:nvPr/>
+          </p:nvSpPr>
+          <p:spPr>
+            <a:xfrm>
+              <a:off x="1197935" y="2113773"/>
+              <a:ext cx="430686" cy="430686"/>
+            </a:xfrm>
+            <a:prstGeom prst="ellipse">
+              <a:avLst/>
+            </a:prstGeom>
+          </p:spPr>
+          <p:style>
+            <a:lnRef idx="2">
+              <a:schemeClr val="dk1">
+                <a:shade val="50000"/>
+              </a:schemeClr>
+            </a:lnRef>
+            <a:fillRef idx="1">
+              <a:schemeClr val="dk1"/>
+            </a:fillRef>
+            <a:effectRef idx="0">
+              <a:schemeClr val="dk1"/>
+            </a:effectRef>
+            <a:fontRef idx="minor">
+              <a:schemeClr val="lt1"/>
+            </a:fontRef>
+          </p:style>
+          <p:txBody>
+            <a:bodyPr rtlCol="0" anchor="ctr"/>
+            <a:lstStyle/>
+            <a:p>
+              <a:pPr algn="ctr"/>
+              <a:endParaRPr lang="en-US"/>
+            </a:p>
+          </p:txBody>
+        </p:sp>
+        <p:sp>
+          <p:nvSpPr>
+            <p:cNvPr id="15" name="Oval 14"/>
+            <p:cNvSpPr/>
+            <p:nvPr/>
+          </p:nvSpPr>
+          <p:spPr>
+            <a:xfrm>
+              <a:off x="2240969" y="2789578"/>
+              <a:ext cx="430686" cy="430686"/>
+            </a:xfrm>
+            <a:prstGeom prst="ellipse">
+              <a:avLst/>
+            </a:prstGeom>
+          </p:spPr>
+          <p:style>
+            <a:lnRef idx="2">
+              <a:schemeClr val="dk1">
+                <a:shade val="50000"/>
+              </a:schemeClr>
+            </a:lnRef>
+            <a:fillRef idx="1">
+              <a:schemeClr val="dk1"/>
+            </a:fillRef>
+            <a:effectRef idx="0">
+              <a:schemeClr val="dk1"/>
+            </a:effectRef>
+            <a:fontRef idx="minor">
+              <a:schemeClr val="lt1"/>
+            </a:fontRef>
+          </p:style>
+          <p:txBody>
+            <a:bodyPr rtlCol="0" anchor="ctr"/>
+            <a:lstStyle/>
+            <a:p>
+              <a:pPr algn="ctr"/>
+              <a:endParaRPr lang="en-US"/>
+            </a:p>
+          </p:txBody>
+        </p:sp>
+        <p:sp>
+          <p:nvSpPr>
+            <p:cNvPr id="16" name="Oval 15"/>
+            <p:cNvSpPr/>
+            <p:nvPr/>
+          </p:nvSpPr>
+          <p:spPr>
+            <a:xfrm>
+              <a:off x="3006608" y="3004921"/>
+              <a:ext cx="430686" cy="430686"/>
+            </a:xfrm>
+            <a:prstGeom prst="ellipse">
+              <a:avLst/>
+            </a:prstGeom>
+          </p:spPr>
+          <p:style>
+            <a:lnRef idx="2">
+              <a:schemeClr val="dk1">
+                <a:shade val="50000"/>
+              </a:schemeClr>
+            </a:lnRef>
+            <a:fillRef idx="1">
+              <a:schemeClr val="dk1"/>
+            </a:fillRef>
+            <a:effectRef idx="0">
+              <a:schemeClr val="dk1"/>
+            </a:effectRef>
+            <a:fontRef idx="minor">
+              <a:schemeClr val="lt1"/>
+            </a:fontRef>
+          </p:style>
+          <p:txBody>
+            <a:bodyPr rtlCol="0" anchor="ctr"/>
+            <a:lstStyle/>
+            <a:p>
+              <a:pPr algn="ctr"/>
+              <a:endParaRPr lang="en-US"/>
+            </a:p>
+          </p:txBody>
+        </p:sp>
+        <p:sp>
+          <p:nvSpPr>
+            <p:cNvPr id="17" name="Oval 16"/>
+            <p:cNvSpPr/>
+            <p:nvPr/>
+          </p:nvSpPr>
+          <p:spPr>
+            <a:xfrm>
+              <a:off x="2907879" y="2151468"/>
+              <a:ext cx="430686" cy="430686"/>
+            </a:xfrm>
+            <a:prstGeom prst="ellipse">
+              <a:avLst/>
+            </a:prstGeom>
+          </p:spPr>
+          <p:style>
+            <a:lnRef idx="2">
+              <a:schemeClr val="dk1">
+                <a:shade val="50000"/>
+              </a:schemeClr>
+            </a:lnRef>
+            <a:fillRef idx="1">
+              <a:schemeClr val="dk1"/>
+            </a:fillRef>
+            <a:effectRef idx="0">
+              <a:schemeClr val="dk1"/>
+            </a:effectRef>
+            <a:fontRef idx="minor">
+              <a:schemeClr val="lt1"/>
+            </a:fontRef>
+          </p:style>
+          <p:txBody>
+            <a:bodyPr rtlCol="0" anchor="ctr"/>
+            <a:lstStyle/>
+            <a:p>
+              <a:pPr algn="ctr"/>
+              <a:endParaRPr lang="en-US"/>
+            </a:p>
+          </p:txBody>
+        </p:sp>
+        <p:sp>
+          <p:nvSpPr>
+            <p:cNvPr id="18" name="Oval 17"/>
+            <p:cNvSpPr/>
+            <p:nvPr/>
+          </p:nvSpPr>
+          <p:spPr>
+            <a:xfrm>
+              <a:off x="1742191" y="3302238"/>
+              <a:ext cx="430686" cy="430686"/>
+            </a:xfrm>
+            <a:prstGeom prst="ellipse">
+              <a:avLst/>
+            </a:prstGeom>
+          </p:spPr>
+          <p:style>
+            <a:lnRef idx="2">
+              <a:schemeClr val="dk1">
+                <a:shade val="50000"/>
+              </a:schemeClr>
+            </a:lnRef>
+            <a:fillRef idx="1">
+              <a:schemeClr val="dk1"/>
+            </a:fillRef>
+            <a:effectRef idx="0">
+              <a:schemeClr val="dk1"/>
+            </a:effectRef>
+            <a:fontRef idx="minor">
+              <a:schemeClr val="lt1"/>
+            </a:fontRef>
+          </p:style>
+          <p:txBody>
+            <a:bodyPr rtlCol="0" anchor="ctr"/>
+            <a:lstStyle/>
+            <a:p>
+              <a:pPr algn="ctr"/>
+              <a:endParaRPr lang="en-US"/>
+            </a:p>
+          </p:txBody>
+        </p:sp>
+        <p:sp>
+          <p:nvSpPr>
+            <p:cNvPr id="20" name="Oval 19"/>
+            <p:cNvSpPr/>
+            <p:nvPr/>
+          </p:nvSpPr>
+          <p:spPr>
+            <a:xfrm>
+              <a:off x="2140410" y="1389306"/>
+              <a:ext cx="430686" cy="430686"/>
+            </a:xfrm>
+            <a:prstGeom prst="ellipse">
+              <a:avLst/>
+            </a:prstGeom>
+          </p:spPr>
+          <p:style>
+            <a:lnRef idx="2">
+              <a:schemeClr val="dk1">
+                <a:shade val="50000"/>
+              </a:schemeClr>
+            </a:lnRef>
+            <a:fillRef idx="1">
+              <a:schemeClr val="dk1"/>
+            </a:fillRef>
+            <a:effectRef idx="0">
+              <a:schemeClr val="dk1"/>
+            </a:effectRef>
+            <a:fontRef idx="minor">
+              <a:schemeClr val="lt1"/>
+            </a:fontRef>
+          </p:style>
+          <p:txBody>
+            <a:bodyPr rtlCol="0" anchor="ctr"/>
+            <a:lstStyle/>
+            <a:p>
+              <a:pPr algn="ctr"/>
+              <a:endParaRPr lang="en-US"/>
+            </a:p>
+          </p:txBody>
+        </p:sp>
+        <p:sp>
+          <p:nvSpPr>
+            <p:cNvPr id="21" name="Oval 20"/>
+            <p:cNvSpPr/>
+            <p:nvPr/>
+          </p:nvSpPr>
+          <p:spPr>
+            <a:xfrm>
+              <a:off x="3545244" y="2511930"/>
+              <a:ext cx="430686" cy="430686"/>
+            </a:xfrm>
+            <a:prstGeom prst="ellipse">
+              <a:avLst/>
+            </a:prstGeom>
+          </p:spPr>
+          <p:style>
+            <a:lnRef idx="2">
+              <a:schemeClr val="dk1">
+                <a:shade val="50000"/>
+              </a:schemeClr>
+            </a:lnRef>
+            <a:fillRef idx="1">
+              <a:schemeClr val="dk1"/>
+            </a:fillRef>
+            <a:effectRef idx="0">
+              <a:schemeClr val="dk1"/>
+            </a:effectRef>
+            <a:fontRef idx="minor">
+              <a:schemeClr val="lt1"/>
+            </a:fontRef>
+          </p:style>
+          <p:txBody>
+            <a:bodyPr rtlCol="0" anchor="ctr"/>
+            <a:lstStyle/>
+            <a:p>
+              <a:pPr algn="ctr"/>
+              <a:endParaRPr lang="en-US"/>
+            </a:p>
+          </p:txBody>
+        </p:sp>
+        <p:cxnSp>
+          <p:nvCxnSpPr>
+            <p:cNvPr id="22" name="Straight Connector 21"/>
+            <p:cNvCxnSpPr/>
+            <p:nvPr/>
+          </p:nvCxnSpPr>
+          <p:spPr>
+            <a:xfrm flipV="1">
+              <a:off x="1413278" y="2250678"/>
+              <a:ext cx="789920" cy="78439"/>
+            </a:xfrm>
+            <a:prstGeom prst="line">
+              <a:avLst/>
+            </a:prstGeom>
+            <a:ln w="76200"/>
+          </p:spPr>
+          <p:style>
+            <a:lnRef idx="3">
+              <a:schemeClr val="dk1"/>
+            </a:lnRef>
+            <a:fillRef idx="0">
+              <a:schemeClr val="dk1"/>
+            </a:fillRef>
+            <a:effectRef idx="2">
+              <a:schemeClr val="dk1"/>
+            </a:effectRef>
+            <a:fontRef idx="minor">
+              <a:schemeClr val="tx1"/>
+            </a:fontRef>
+          </p:style>
+        </p:cxnSp>
+        <p:cxnSp>
+          <p:nvCxnSpPr>
+            <p:cNvPr id="26" name="Straight Connector 25"/>
+            <p:cNvCxnSpPr/>
+            <p:nvPr/>
+          </p:nvCxnSpPr>
+          <p:spPr>
+            <a:xfrm flipV="1">
+              <a:off x="2160765" y="1630651"/>
+              <a:ext cx="194988" cy="620027"/>
+            </a:xfrm>
+            <a:prstGeom prst="line">
+              <a:avLst/>
+            </a:prstGeom>
+            <a:ln w="76200"/>
+          </p:spPr>
+          <p:style>
+            <a:lnRef idx="3">
+              <a:schemeClr val="dk1"/>
+            </a:lnRef>
+            <a:fillRef idx="0">
+              <a:schemeClr val="dk1"/>
+            </a:fillRef>
+            <a:effectRef idx="2">
+              <a:schemeClr val="dk1"/>
+            </a:effectRef>
+            <a:fontRef idx="minor">
+              <a:schemeClr val="tx1"/>
+            </a:fontRef>
+          </p:style>
+        </p:cxnSp>
+        <p:cxnSp>
+          <p:nvCxnSpPr>
+            <p:cNvPr id="28" name="Straight Connector 27"/>
+            <p:cNvCxnSpPr/>
+            <p:nvPr/>
+          </p:nvCxnSpPr>
+          <p:spPr>
+            <a:xfrm>
+              <a:off x="2140410" y="2268740"/>
+              <a:ext cx="315902" cy="754499"/>
+            </a:xfrm>
+            <a:prstGeom prst="line">
+              <a:avLst/>
+            </a:prstGeom>
+            <a:ln w="76200"/>
+          </p:spPr>
+          <p:style>
+            <a:lnRef idx="3">
+              <a:schemeClr val="dk1"/>
+            </a:lnRef>
+            <a:fillRef idx="0">
+              <a:schemeClr val="dk1"/>
+            </a:fillRef>
+            <a:effectRef idx="2">
+              <a:schemeClr val="dk1"/>
+            </a:effectRef>
+            <a:fontRef idx="minor">
+              <a:schemeClr val="tx1"/>
+            </a:fontRef>
+          </p:style>
+        </p:cxnSp>
+        <p:cxnSp>
+          <p:nvCxnSpPr>
+            <p:cNvPr id="30" name="Straight Connector 29"/>
+            <p:cNvCxnSpPr/>
+            <p:nvPr/>
+          </p:nvCxnSpPr>
+          <p:spPr>
+            <a:xfrm flipV="1">
+              <a:off x="1939699" y="3077859"/>
+              <a:ext cx="492093" cy="465962"/>
+            </a:xfrm>
+            <a:prstGeom prst="line">
+              <a:avLst/>
+            </a:prstGeom>
+            <a:ln w="76200"/>
+          </p:spPr>
+          <p:style>
+            <a:lnRef idx="3">
+              <a:schemeClr val="dk1"/>
+            </a:lnRef>
+            <a:fillRef idx="0">
+              <a:schemeClr val="dk1"/>
+            </a:fillRef>
+            <a:effectRef idx="2">
+              <a:schemeClr val="dk1"/>
+            </a:effectRef>
+            <a:fontRef idx="minor">
+              <a:schemeClr val="tx1"/>
+            </a:fontRef>
+          </p:style>
+        </p:cxnSp>
+        <p:cxnSp>
+          <p:nvCxnSpPr>
+            <p:cNvPr id="2048" name="Straight Connector 2047"/>
+            <p:cNvCxnSpPr/>
+            <p:nvPr/>
+          </p:nvCxnSpPr>
+          <p:spPr>
+            <a:xfrm flipV="1">
+              <a:off x="3123222" y="1612589"/>
+              <a:ext cx="308323" cy="782230"/>
+            </a:xfrm>
+            <a:prstGeom prst="line">
+              <a:avLst/>
+            </a:prstGeom>
+            <a:ln w="76200"/>
+          </p:spPr>
+          <p:style>
+            <a:lnRef idx="3">
+              <a:schemeClr val="dk1"/>
+            </a:lnRef>
+            <a:fillRef idx="0">
+              <a:schemeClr val="dk1"/>
+            </a:fillRef>
+            <a:effectRef idx="2">
+              <a:schemeClr val="dk1"/>
+            </a:effectRef>
+            <a:fontRef idx="minor">
+              <a:schemeClr val="tx1"/>
+            </a:fontRef>
+          </p:style>
+        </p:cxnSp>
+        <p:cxnSp>
+          <p:nvCxnSpPr>
+            <p:cNvPr id="2051" name="Straight Connector 2050"/>
+            <p:cNvCxnSpPr/>
+            <p:nvPr/>
+          </p:nvCxnSpPr>
+          <p:spPr>
+            <a:xfrm flipH="1">
+              <a:off x="2456312" y="2402423"/>
+              <a:ext cx="666910" cy="675436"/>
+            </a:xfrm>
+            <a:prstGeom prst="line">
+              <a:avLst/>
+            </a:prstGeom>
+            <a:ln w="76200"/>
+          </p:spPr>
+          <p:style>
+            <a:lnRef idx="3">
+              <a:schemeClr val="dk1"/>
+            </a:lnRef>
+            <a:fillRef idx="0">
+              <a:schemeClr val="dk1"/>
+            </a:fillRef>
+            <a:effectRef idx="2">
+              <a:schemeClr val="dk1"/>
+            </a:effectRef>
+            <a:fontRef idx="minor">
+              <a:schemeClr val="tx1"/>
+            </a:fontRef>
+          </p:style>
+        </p:cxnSp>
+        <p:cxnSp>
+          <p:nvCxnSpPr>
+            <p:cNvPr id="2053" name="Straight Connector 2052"/>
+            <p:cNvCxnSpPr/>
+            <p:nvPr/>
+          </p:nvCxnSpPr>
+          <p:spPr>
+            <a:xfrm flipH="1">
+              <a:off x="3229210" y="2712831"/>
+              <a:ext cx="560922" cy="529199"/>
+            </a:xfrm>
+            <a:prstGeom prst="line">
+              <a:avLst/>
+            </a:prstGeom>
+            <a:ln w="76200"/>
+          </p:spPr>
+          <p:style>
+            <a:lnRef idx="3">
+              <a:schemeClr val="dk1"/>
+            </a:lnRef>
+            <a:fillRef idx="0">
+              <a:schemeClr val="dk1"/>
+            </a:fillRef>
+            <a:effectRef idx="2">
+              <a:schemeClr val="dk1"/>
+            </a:effectRef>
+            <a:fontRef idx="minor">
+              <a:schemeClr val="tx1"/>
+            </a:fontRef>
+          </p:style>
+        </p:cxnSp>
+        <p:cxnSp>
+          <p:nvCxnSpPr>
+            <p:cNvPr id="2057" name="Straight Connector 2056"/>
+            <p:cNvCxnSpPr/>
+            <p:nvPr/>
+          </p:nvCxnSpPr>
+          <p:spPr>
+            <a:xfrm flipH="1" flipV="1">
+              <a:off x="2477113" y="3040848"/>
+              <a:ext cx="739089" cy="207242"/>
+            </a:xfrm>
+            <a:prstGeom prst="line">
+              <a:avLst/>
+            </a:prstGeom>
+            <a:ln w="76200"/>
+          </p:spPr>
+          <p:style>
+            <a:lnRef idx="3">
+              <a:schemeClr val="dk1"/>
+            </a:lnRef>
+            <a:fillRef idx="0">
+              <a:schemeClr val="dk1"/>
+            </a:fillRef>
+            <a:effectRef idx="2">
+              <a:schemeClr val="dk1"/>
+            </a:effectRef>
+            <a:fontRef idx="minor">
+              <a:schemeClr val="tx1"/>
+            </a:fontRef>
+          </p:style>
+        </p:cxnSp>
+      </p:grpSp>
     </p:spTree>
     <p:extLst>
       <p:ext uri="{BB962C8B-B14F-4D97-AF65-F5344CB8AC3E}">

</xml_diff>